<commit_message>
Enabled snmpd in dispatcher
</commit_message>
<xml_diff>
--- a/docs/DermalogABISBEDeployment.pptx
+++ b/docs/DermalogABISBEDeployment.pptx
@@ -21,7 +21,6 @@
     <p:sldId id="266" r:id="rId16"/>
     <p:sldId id="267" r:id="rId17"/>
     <p:sldId id="268" r:id="rId18"/>
-    <p:sldId id="269" r:id="rId19"/>
   </p:sldIdLst>
   <p:sldSz cx="9144000" cy="6858000"/>
   <p:notesSz cx="7772400" cy="10058400"/>
@@ -5489,7 +5488,7 @@
         <p:spPr>
           <a:xfrm>
             <a:off x="0" y="6165360"/>
-            <a:ext cx="9142200" cy="693360"/>
+            <a:ext cx="9141120" cy="692280"/>
           </a:xfrm>
           <a:prstGeom prst="rect">
             <a:avLst/>
@@ -5512,7 +5511,7 @@
         <p:spPr>
           <a:xfrm>
             <a:off x="0" y="1080"/>
-            <a:ext cx="9140400" cy="6860880"/>
+            <a:ext cx="9139320" cy="6859800"/>
           </a:xfrm>
           <a:prstGeom prst="rect">
             <a:avLst/>
@@ -5795,7 +5794,7 @@
         <p:spPr>
           <a:xfrm>
             <a:off x="0" y="6165360"/>
-            <a:ext cx="9142200" cy="693360"/>
+            <a:ext cx="9141120" cy="692280"/>
           </a:xfrm>
           <a:prstGeom prst="rect">
             <a:avLst/>
@@ -6078,7 +6077,7 @@
         <p:spPr>
           <a:xfrm>
             <a:off x="0" y="6165360"/>
-            <a:ext cx="9142200" cy="693360"/>
+            <a:ext cx="9141120" cy="692280"/>
           </a:xfrm>
           <a:prstGeom prst="rect">
             <a:avLst/>
@@ -6101,7 +6100,7 @@
         <p:spPr>
           <a:xfrm>
             <a:off x="565200" y="3285000"/>
-            <a:ext cx="1953360" cy="1753920"/>
+            <a:ext cx="1952280" cy="1752840"/>
           </a:xfrm>
           <a:prstGeom prst="rect">
             <a:avLst/>
@@ -6120,7 +6119,7 @@
         <p:spPr>
           <a:xfrm>
             <a:off x="323640" y="2133000"/>
-            <a:ext cx="3238560" cy="1002240"/>
+            <a:ext cx="3237480" cy="1002240"/>
           </a:xfrm>
           <a:prstGeom prst="rect">
             <a:avLst/>
@@ -6251,7 +6250,7 @@
         <p:spPr>
           <a:xfrm>
             <a:off x="3276000" y="2134440"/>
-            <a:ext cx="3238560" cy="1002240"/>
+            <a:ext cx="3237480" cy="1002240"/>
           </a:xfrm>
           <a:prstGeom prst="rect">
             <a:avLst/>
@@ -6382,7 +6381,7 @@
         <p:spPr>
           <a:xfrm>
             <a:off x="6149160" y="2153520"/>
-            <a:ext cx="3238560" cy="1184760"/>
+            <a:ext cx="3237480" cy="1184760"/>
           </a:xfrm>
           <a:prstGeom prst="rect">
             <a:avLst/>
@@ -6513,7 +6512,7 @@
         <p:spPr>
           <a:xfrm>
             <a:off x="3272400" y="3558960"/>
-            <a:ext cx="3238560" cy="1184760"/>
+            <a:ext cx="3237480" cy="1184760"/>
           </a:xfrm>
           <a:prstGeom prst="rect">
             <a:avLst/>
@@ -6664,7 +6663,7 @@
         <p:spPr>
           <a:xfrm>
             <a:off x="6149160" y="3533400"/>
-            <a:ext cx="3821400" cy="1184760"/>
+            <a:ext cx="3820320" cy="1184760"/>
           </a:xfrm>
           <a:prstGeom prst="rect">
             <a:avLst/>
@@ -7079,7 +7078,7 @@
         <p:spPr>
           <a:xfrm>
             <a:off x="0" y="6165360"/>
-            <a:ext cx="9142200" cy="693360"/>
+            <a:ext cx="9141120" cy="692280"/>
           </a:xfrm>
           <a:prstGeom prst="rect">
             <a:avLst/>
@@ -7351,7 +7350,7 @@
         <p:spPr>
           <a:xfrm>
             <a:off x="6458040" y="6356520"/>
-            <a:ext cx="2055600" cy="363240"/>
+            <a:ext cx="2054520" cy="362160"/>
           </a:xfrm>
           <a:prstGeom prst="rect">
             <a:avLst/>
@@ -7377,7 +7376,7 @@
                 <a:spcPct val="100000"/>
               </a:lnSpc>
             </a:pPr>
-            <a:fld id="{73850C24-06E2-4A3A-90C2-40E083B997BB}" type="slidenum">
+            <a:fld id="{C0804ABD-4714-4F99-B921-5AAA0FB52974}" type="slidenum">
               <a:rPr b="0" lang="en-US" sz="900" spc="-1" strike="noStrike">
                 <a:solidFill>
                   <a:srgbClr val="8b8b8b"/>
@@ -7402,7 +7401,7 @@
         <p:spPr>
           <a:xfrm>
             <a:off x="640080" y="404640"/>
-            <a:ext cx="7979760" cy="1294200"/>
+            <a:ext cx="7978680" cy="1293120"/>
           </a:xfrm>
           <a:prstGeom prst="rect">
             <a:avLst/>
@@ -7453,7 +7452,7 @@
         <p:spPr>
           <a:xfrm>
             <a:off x="1763640" y="1717200"/>
-            <a:ext cx="6856200" cy="473400"/>
+            <a:ext cx="6855120" cy="472320"/>
           </a:xfrm>
           <a:prstGeom prst="rect">
             <a:avLst/>
@@ -7479,7 +7478,7 @@
         <p:spPr>
           <a:xfrm>
             <a:off x="1763640" y="2192400"/>
-            <a:ext cx="6856200" cy="1222200"/>
+            <a:ext cx="6855120" cy="1221120"/>
           </a:xfrm>
           <a:prstGeom prst="rect">
             <a:avLst/>
@@ -7516,7 +7515,7 @@
                 <a:latin typeface="Calibri"/>
                 <a:ea typeface="DejaVu Sans"/>
               </a:rPr>
-              <a:t>Daniel Derstappen/Thomas Hluchnik • ABIS BE • June 2021</a:t>
+              <a:t>Daniel Derstappen • ABIS Backend • September 2022</a:t>
             </a:r>
             <a:endParaRPr b="0" lang="en-US" sz="1800" spc="-1" strike="noStrike">
               <a:latin typeface="Arial"/>
@@ -7567,7 +7566,7 @@
         <p:spPr>
           <a:xfrm>
             <a:off x="548640" y="1097280"/>
-            <a:ext cx="7954200" cy="4160880"/>
+            <a:ext cx="7953120" cy="4159800"/>
           </a:xfrm>
           <a:prstGeom prst="rect">
             <a:avLst/>
@@ -7588,7 +7587,7 @@
             <a:noAutofit/>
           </a:bodyPr>
           <a:p>
-            <a:pPr marL="171360" indent="-169560">
+            <a:pPr marL="171360" indent="-168480">
               <a:lnSpc>
                 <a:spcPct val="90000"/>
               </a:lnSpc>
@@ -7609,14 +7608,14 @@
                 <a:latin typeface="Calibri Light"/>
                 <a:ea typeface="DejaVu Sans"/>
               </a:rPr>
-              <a:t>Change configuration data in Git repo</a:t>
+              <a:t>Prüfung der Dienstverfügbarkeit mit geeigneten Werkzeugen (Icinga2, Zabbix, check_mk…)</a:t>
             </a:r>
             <a:endParaRPr b="0" lang="en-US" sz="2100" spc="-1" strike="noStrike">
               <a:latin typeface="Arial"/>
             </a:endParaRPr>
           </a:p>
           <a:p>
-            <a:pPr marL="171360" indent="-169560">
+            <a:pPr marL="171360" indent="-168480">
               <a:lnSpc>
                 <a:spcPct val="90000"/>
               </a:lnSpc>
@@ -7637,14 +7636,14 @@
                 <a:latin typeface="Calibri Light"/>
                 <a:ea typeface="DejaVu Sans"/>
               </a:rPr>
-              <a:t>Open console (terminal, Powershell on Windows)</a:t>
+              <a:t>Automatische Benachtigung bei kritischen Zuständen</a:t>
             </a:r>
             <a:endParaRPr b="0" lang="en-US" sz="2100" spc="-1" strike="noStrike">
               <a:latin typeface="Arial"/>
             </a:endParaRPr>
           </a:p>
           <a:p>
-            <a:pPr marL="171360" indent="-169560">
+            <a:pPr marL="171360" indent="-168480">
               <a:lnSpc>
                 <a:spcPct val="90000"/>
               </a:lnSpc>
@@ -7665,14 +7664,130 @@
                 <a:latin typeface="Calibri Light"/>
                 <a:ea typeface="DejaVu Sans"/>
               </a:rPr>
-              <a:t>cd into installer directory of ABIS Backend release</a:t>
+              <a:t>Allgemeiner Systemzustand</a:t>
             </a:r>
             <a:endParaRPr b="0" lang="en-US" sz="2100" spc="-1" strike="noStrike">
               <a:latin typeface="Arial"/>
             </a:endParaRPr>
           </a:p>
           <a:p>
-            <a:pPr marL="171360" indent="-169560">
+            <a:pPr lvl="1" marL="432000" indent="-214200">
+              <a:lnSpc>
+                <a:spcPct val="90000"/>
+              </a:lnSpc>
+              <a:spcBef>
+                <a:spcPts val="751"/>
+              </a:spcBef>
+              <a:buClr>
+                <a:srgbClr val="000000"/>
+              </a:buClr>
+              <a:buSzPct val="45000"/>
+              <a:buFont typeface="Wingdings" charset="2"/>
+              <a:buChar char=""/>
+            </a:pPr>
+            <a:r>
+              <a:rPr b="0" lang="en-US" sz="2100" spc="-1" strike="noStrike">
+                <a:solidFill>
+                  <a:srgbClr val="004289"/>
+                </a:solidFill>
+                <a:latin typeface="Calibri Light"/>
+                <a:ea typeface="DejaVu Sans"/>
+              </a:rPr>
+              <a:t>RAM (free, swap)</a:t>
+            </a:r>
+            <a:endParaRPr b="0" lang="en-US" sz="2100" spc="-1" strike="noStrike">
+              <a:latin typeface="Arial"/>
+            </a:endParaRPr>
+          </a:p>
+          <a:p>
+            <a:pPr lvl="1" marL="432000" indent="-214200">
+              <a:lnSpc>
+                <a:spcPct val="90000"/>
+              </a:lnSpc>
+              <a:spcBef>
+                <a:spcPts val="751"/>
+              </a:spcBef>
+              <a:buClr>
+                <a:srgbClr val="000000"/>
+              </a:buClr>
+              <a:buSzPct val="45000"/>
+              <a:buFont typeface="Wingdings" charset="2"/>
+              <a:buChar char=""/>
+            </a:pPr>
+            <a:r>
+              <a:rPr b="0" lang="en-US" sz="2100" spc="-1" strike="noStrike">
+                <a:solidFill>
+                  <a:srgbClr val="004289"/>
+                </a:solidFill>
+                <a:latin typeface="Calibri Light"/>
+                <a:ea typeface="DejaVu Sans"/>
+              </a:rPr>
+              <a:t>CPU</a:t>
+            </a:r>
+            <a:endParaRPr b="0" lang="en-US" sz="2100" spc="-1" strike="noStrike">
+              <a:latin typeface="Arial"/>
+            </a:endParaRPr>
+          </a:p>
+          <a:p>
+            <a:pPr lvl="1" marL="432000" indent="-214200">
+              <a:lnSpc>
+                <a:spcPct val="90000"/>
+              </a:lnSpc>
+              <a:spcBef>
+                <a:spcPts val="751"/>
+              </a:spcBef>
+              <a:buClr>
+                <a:srgbClr val="000000"/>
+              </a:buClr>
+              <a:buSzPct val="45000"/>
+              <a:buFont typeface="Wingdings" charset="2"/>
+              <a:buChar char=""/>
+            </a:pPr>
+            <a:r>
+              <a:rPr b="0" lang="en-US" sz="2100" spc="-1" strike="noStrike">
+                <a:solidFill>
+                  <a:srgbClr val="004289"/>
+                </a:solidFill>
+                <a:latin typeface="Calibri Light"/>
+                <a:ea typeface="DejaVu Sans"/>
+              </a:rPr>
+              <a:t>Disk</a:t>
+            </a:r>
+            <a:endParaRPr b="0" lang="en-US" sz="2100" spc="-1" strike="noStrike">
+              <a:latin typeface="Arial"/>
+            </a:endParaRPr>
+          </a:p>
+          <a:p>
+            <a:pPr lvl="1" marL="432000" indent="-214200">
+              <a:lnSpc>
+                <a:spcPct val="90000"/>
+              </a:lnSpc>
+              <a:spcBef>
+                <a:spcPts val="751"/>
+              </a:spcBef>
+              <a:buClr>
+                <a:srgbClr val="000000"/>
+              </a:buClr>
+              <a:buSzPct val="45000"/>
+              <a:buFont typeface="Wingdings" charset="2"/>
+              <a:buChar char=""/>
+            </a:pPr>
+            <a:r>
+              <a:rPr b="0" lang="en-US" sz="2100" spc="-1" strike="noStrike">
+                <a:solidFill>
+                  <a:srgbClr val="004289"/>
+                </a:solidFill>
+                <a:latin typeface="Calibri Light"/>
+                <a:ea typeface="DejaVu Sans"/>
+              </a:rPr>
+              <a:t>Network Konnektivität</a:t>
+            </a:r>
+            <a:endParaRPr b="0" lang="en-US" sz="2100" spc="-1" strike="noStrike">
+              <a:latin typeface="Arial"/>
+            </a:endParaRPr>
+          </a:p>
+          <a:p>
+            <a:pPr marL="171360" indent="-168480">
               <a:lnSpc>
                 <a:spcPct val="90000"/>
               </a:lnSpc>
@@ -7693,25 +7808,14 @@
                 <a:latin typeface="Calibri Light"/>
                 <a:ea typeface="DejaVu Sans"/>
               </a:rPr>
-              <a:t>Run plan to reconfigure data of Puppet environment</a:t>
-            </a:r>
-            <a:br/>
-            <a:r>
-              <a:rPr b="0" lang="en-US" sz="1800" spc="-1" strike="noStrike">
-                <a:solidFill>
-                  <a:srgbClr val="004289"/>
-                </a:solidFill>
-                <a:latin typeface="DejaVu Sans Mono"/>
-                <a:ea typeface="DejaVu Sans"/>
-              </a:rPr>
-              <a:t>bolt plan run abis_tools::prepare_environment_data data_repo=&lt;path to git repo&gt; data_branch=&lt;branch in git repo&gt; environment_name=abis -t &lt;target host&gt; -u root ...</a:t>
-            </a:r>
-            <a:endParaRPr b="0" lang="en-US" sz="1800" spc="-1" strike="noStrike">
-              <a:latin typeface="Arial"/>
-            </a:endParaRPr>
-          </a:p>
-          <a:p>
-            <a:pPr marL="171360" indent="-169560">
+              <a:t>DB Zustand</a:t>
+            </a:r>
+            <a:endParaRPr b="0" lang="en-US" sz="2100" spc="-1" strike="noStrike">
+              <a:latin typeface="Arial"/>
+            </a:endParaRPr>
+          </a:p>
+          <a:p>
+            <a:pPr marL="171360" indent="-168480">
               <a:lnSpc>
                 <a:spcPct val="90000"/>
               </a:lnSpc>
@@ -7732,25 +7836,14 @@
                 <a:latin typeface="Calibri Light"/>
                 <a:ea typeface="DejaVu Sans"/>
               </a:rPr>
-              <a:t>Apply the changes</a:t>
-            </a:r>
-            <a:br/>
-            <a:r>
-              <a:rPr b="0" lang="en-US" sz="1800" spc="-1" strike="noStrike">
-                <a:solidFill>
-                  <a:srgbClr val="004289"/>
-                </a:solidFill>
-                <a:latin typeface="DejaVu Sans Mono"/>
-                <a:ea typeface="DejaVu Sans"/>
-              </a:rPr>
-              <a:t>bolt task run abis_tools::agent environment=abis nomaster=true  -t &lt;target host&gt; -u root ...</a:t>
-            </a:r>
-            <a:endParaRPr b="0" lang="en-US" sz="1800" spc="-1" strike="noStrike">
-              <a:latin typeface="Arial"/>
-            </a:endParaRPr>
-          </a:p>
-          <a:p>
-            <a:pPr marL="171360" indent="-169560">
+              <a:t>ABIS Backend Dienste</a:t>
+            </a:r>
+            <a:endParaRPr b="0" lang="en-US" sz="2100" spc="-1" strike="noStrike">
+              <a:latin typeface="Arial"/>
+            </a:endParaRPr>
+          </a:p>
+          <a:p>
+            <a:pPr lvl="1" marL="432000" indent="-214200">
               <a:lnSpc>
                 <a:spcPct val="90000"/>
               </a:lnSpc>
@@ -7758,10 +7851,11 @@
                 <a:spcPts val="751"/>
               </a:spcBef>
               <a:buClr>
-                <a:srgbClr val="004289"/>
+                <a:srgbClr val="000000"/>
               </a:buClr>
-              <a:buFont typeface="Arial"/>
-              <a:buChar char="•"/>
+              <a:buSzPct val="45000"/>
+              <a:buFont typeface="Wingdings" charset="2"/>
+              <a:buChar char=""/>
             </a:pPr>
             <a:r>
               <a:rPr b="0" lang="en-US" sz="2100" spc="-1" strike="noStrike">
@@ -7771,46 +7865,38 @@
                 <a:latin typeface="Calibri Light"/>
                 <a:ea typeface="DejaVu Sans"/>
               </a:rPr>
-              <a:t>Check target system state</a:t>
-            </a:r>
-            <a:br/>
-            <a:r>
-              <a:rPr b="0" lang="en-US" sz="1800" spc="-1" strike="noStrike">
+              <a:t>Prüfung info/metrics Endpunkte mit HTTP</a:t>
+            </a:r>
+            <a:endParaRPr b="0" lang="en-US" sz="2100" spc="-1" strike="noStrike">
+              <a:latin typeface="Arial"/>
+            </a:endParaRPr>
+          </a:p>
+          <a:p>
+            <a:pPr lvl="1" marL="432000" indent="-214200">
+              <a:lnSpc>
+                <a:spcPct val="90000"/>
+              </a:lnSpc>
+              <a:spcBef>
+                <a:spcPts val="751"/>
+              </a:spcBef>
+              <a:buClr>
+                <a:srgbClr val="000000"/>
+              </a:buClr>
+              <a:buSzPct val="45000"/>
+              <a:buFont typeface="Wingdings" charset="2"/>
+              <a:buChar char=""/>
+            </a:pPr>
+            <a:r>
+              <a:rPr b="0" lang="en-US" sz="2100" spc="-1" strike="noStrike">
                 <a:solidFill>
                   <a:srgbClr val="004289"/>
                 </a:solidFill>
-                <a:latin typeface="DejaVu Sans Mono"/>
+                <a:latin typeface="Calibri Light"/>
                 <a:ea typeface="DejaVu Sans"/>
               </a:rPr>
-              <a:t>bolt command run ‘abis_systemcheck.sh’ -t &lt;target host&gt; -u root ...</a:t>
-            </a:r>
-            <a:endParaRPr b="0" lang="en-US" sz="1800" spc="-1" strike="noStrike">
-              <a:latin typeface="Arial"/>
-            </a:endParaRPr>
-          </a:p>
-          <a:p>
-            <a:pPr>
-              <a:lnSpc>
-                <a:spcPct val="90000"/>
-              </a:lnSpc>
-              <a:spcBef>
-                <a:spcPts val="751"/>
-              </a:spcBef>
-            </a:pPr>
-            <a:endParaRPr b="0" lang="en-US" sz="1800" spc="-1" strike="noStrike">
-              <a:latin typeface="Arial"/>
-            </a:endParaRPr>
-          </a:p>
-          <a:p>
-            <a:pPr>
-              <a:lnSpc>
-                <a:spcPct val="90000"/>
-              </a:lnSpc>
-              <a:spcBef>
-                <a:spcPts val="751"/>
-              </a:spcBef>
-            </a:pPr>
-            <a:endParaRPr b="0" lang="en-US" sz="1800" spc="-1" strike="noStrike">
+              <a:t>Prüfung von SNMP Variables bei ABIS Matching Dispatcher/Satellite</a:t>
+            </a:r>
+            <a:endParaRPr b="0" lang="en-US" sz="2100" spc="-1" strike="noStrike">
               <a:latin typeface="Arial"/>
             </a:endParaRPr>
           </a:p>
@@ -7825,7 +7911,7 @@
         <p:spPr>
           <a:xfrm>
             <a:off x="6948360" y="182520"/>
-            <a:ext cx="2055600" cy="363240"/>
+            <a:ext cx="2054520" cy="362160"/>
           </a:xfrm>
           <a:prstGeom prst="rect">
             <a:avLst/>
@@ -7851,7 +7937,7 @@
                 <a:spcPct val="100000"/>
               </a:lnSpc>
             </a:pPr>
-            <a:fld id="{684976CF-10F6-4B84-B0BC-C9BF4FF3BC21}" type="slidenum">
+            <a:fld id="{BAEE37CD-5FAA-4F6A-A26A-FE596E23BCAA}" type="slidenum">
               <a:rPr b="0" lang="en-US" sz="900" spc="-1" strike="noStrike">
                 <a:solidFill>
                   <a:srgbClr val="8b93b0"/>
@@ -7876,7 +7962,7 @@
         <p:spPr>
           <a:xfrm>
             <a:off x="628560" y="365040"/>
-            <a:ext cx="7885080" cy="685800"/>
+            <a:ext cx="7884000" cy="684720"/>
           </a:xfrm>
           <a:prstGeom prst="rect">
             <a:avLst/>
@@ -7910,7 +7996,7 @@
                 <a:latin typeface="Calibri Light"/>
                 <a:ea typeface="DejaVu Sans"/>
               </a:rPr>
-              <a:t>ABIS Backend reconfiguration</a:t>
+              <a:t>Monitoring</a:t>
             </a:r>
             <a:endParaRPr b="0" lang="en-US" sz="2800" spc="-1" strike="noStrike">
               <a:latin typeface="Arial"/>
@@ -7961,7 +8047,7 @@
         <p:spPr>
           <a:xfrm>
             <a:off x="548640" y="1097280"/>
-            <a:ext cx="7954200" cy="4160880"/>
+            <a:ext cx="7953120" cy="4159800"/>
           </a:xfrm>
           <a:prstGeom prst="rect">
             <a:avLst/>
@@ -7982,7 +8068,7 @@
             <a:noAutofit/>
           </a:bodyPr>
           <a:p>
-            <a:pPr marL="171360" indent="-169560">
+            <a:pPr marL="171360" indent="-168480">
               <a:lnSpc>
                 <a:spcPct val="90000"/>
               </a:lnSpc>
@@ -7996,21 +8082,23 @@
               <a:buChar char="•"/>
             </a:pPr>
             <a:r>
-              <a:rPr b="0" lang="en-US" sz="2100" spc="-1" strike="noStrike">
+              <a:rPr b="0" lang="en-US" sz="2100" spc="-1" strike="noStrike" u="sng">
                 <a:solidFill>
-                  <a:srgbClr val="004289"/>
+                  <a:srgbClr val="0563c1"/>
                 </a:solidFill>
+                <a:uFillTx/>
                 <a:latin typeface="Calibri Light"/>
                 <a:ea typeface="DejaVu Sans"/>
-              </a:rPr>
-              <a:t>Automate checking of service availability (use Icinga2, Zabbix, check_mk…)</a:t>
+                <a:hlinkClick r:id="rId1"/>
+              </a:rPr>
+              <a:t>https://docs.ansible.com/ansible/latest/index.html</a:t>
             </a:r>
             <a:endParaRPr b="0" lang="en-US" sz="2100" spc="-1" strike="noStrike">
               <a:latin typeface="Arial"/>
             </a:endParaRPr>
           </a:p>
           <a:p>
-            <a:pPr marL="171360" indent="-169560">
+            <a:pPr marL="171360" indent="-168480">
               <a:lnSpc>
                 <a:spcPct val="90000"/>
               </a:lnSpc>
@@ -8024,21 +8112,23 @@
               <a:buChar char="•"/>
             </a:pPr>
             <a:r>
-              <a:rPr b="0" lang="en-US" sz="2100" spc="-1" strike="noStrike">
+              <a:rPr b="0" lang="en-US" sz="2100" spc="-1" strike="noStrike" u="sng">
                 <a:solidFill>
-                  <a:srgbClr val="004289"/>
+                  <a:srgbClr val="0563c1"/>
                 </a:solidFill>
+                <a:uFillTx/>
                 <a:latin typeface="Calibri Light"/>
                 <a:ea typeface="DejaVu Sans"/>
-              </a:rPr>
-              <a:t>Configure notifications as required</a:t>
+                <a:hlinkClick r:id="rId2"/>
+              </a:rPr>
+              <a:t>https://puppet.com/docs/puppet/7/puppet_index.html</a:t>
             </a:r>
             <a:endParaRPr b="0" lang="en-US" sz="2100" spc="-1" strike="noStrike">
               <a:latin typeface="Arial"/>
             </a:endParaRPr>
           </a:p>
           <a:p>
-            <a:pPr marL="171360" indent="-169560">
+            <a:pPr marL="171360" indent="-168480">
               <a:lnSpc>
                 <a:spcPct val="90000"/>
               </a:lnSpc>
@@ -8052,137 +8142,23 @@
               <a:buChar char="•"/>
             </a:pPr>
             <a:r>
-              <a:rPr b="0" lang="en-US" sz="2100" spc="-1" strike="noStrike">
+              <a:rPr b="0" lang="en-US" sz="2100" spc="-1" strike="noStrike" u="sng">
                 <a:solidFill>
-                  <a:srgbClr val="004289"/>
+                  <a:srgbClr val="0563c1"/>
                 </a:solidFill>
+                <a:uFillTx/>
                 <a:latin typeface="Calibri Light"/>
                 <a:ea typeface="DejaVu Sans"/>
-              </a:rPr>
-              <a:t>Check general system health of target host(s)</a:t>
+                <a:hlinkClick r:id="rId3"/>
+              </a:rPr>
+              <a:t>https://puppet.com/docs/bolt/latest/bolt.html</a:t>
             </a:r>
             <a:endParaRPr b="0" lang="en-US" sz="2100" spc="-1" strike="noStrike">
               <a:latin typeface="Arial"/>
             </a:endParaRPr>
           </a:p>
           <a:p>
-            <a:pPr lvl="1" marL="432000" indent="-215280">
-              <a:lnSpc>
-                <a:spcPct val="90000"/>
-              </a:lnSpc>
-              <a:spcBef>
-                <a:spcPts val="751"/>
-              </a:spcBef>
-              <a:buClr>
-                <a:srgbClr val="000000"/>
-              </a:buClr>
-              <a:buSzPct val="45000"/>
-              <a:buFont typeface="Wingdings" charset="2"/>
-              <a:buChar char=""/>
-            </a:pPr>
-            <a:r>
-              <a:rPr b="0" lang="en-US" sz="2100" spc="-1" strike="noStrike">
-                <a:solidFill>
-                  <a:srgbClr val="004289"/>
-                </a:solidFill>
-                <a:latin typeface="Calibri Light"/>
-                <a:ea typeface="DejaVu Sans"/>
-              </a:rPr>
-              <a:t>RAM utilization (free, swap)</a:t>
-            </a:r>
-            <a:endParaRPr b="0" lang="en-US" sz="2100" spc="-1" strike="noStrike">
-              <a:latin typeface="Arial"/>
-            </a:endParaRPr>
-          </a:p>
-          <a:p>
-            <a:pPr lvl="1" marL="432000" indent="-215280">
-              <a:lnSpc>
-                <a:spcPct val="90000"/>
-              </a:lnSpc>
-              <a:spcBef>
-                <a:spcPts val="751"/>
-              </a:spcBef>
-              <a:buClr>
-                <a:srgbClr val="000000"/>
-              </a:buClr>
-              <a:buSzPct val="45000"/>
-              <a:buFont typeface="Wingdings" charset="2"/>
-              <a:buChar char=""/>
-            </a:pPr>
-            <a:r>
-              <a:rPr b="0" lang="en-US" sz="2100" spc="-1" strike="noStrike">
-                <a:solidFill>
-                  <a:srgbClr val="004289"/>
-                </a:solidFill>
-                <a:latin typeface="Calibri Light"/>
-                <a:ea typeface="DejaVu Sans"/>
-              </a:rPr>
-              <a:t>CPU utilization</a:t>
-            </a:r>
-            <a:endParaRPr b="0" lang="en-US" sz="2100" spc="-1" strike="noStrike">
-              <a:latin typeface="Arial"/>
-            </a:endParaRPr>
-          </a:p>
-          <a:p>
-            <a:pPr lvl="1" marL="432000" indent="-215280">
-              <a:lnSpc>
-                <a:spcPct val="90000"/>
-              </a:lnSpc>
-              <a:spcBef>
-                <a:spcPts val="751"/>
-              </a:spcBef>
-              <a:buClr>
-                <a:srgbClr val="000000"/>
-              </a:buClr>
-              <a:buSzPct val="45000"/>
-              <a:buFont typeface="Wingdings" charset="2"/>
-              <a:buChar char=""/>
-            </a:pPr>
-            <a:r>
-              <a:rPr b="0" lang="en-US" sz="2100" spc="-1" strike="noStrike">
-                <a:solidFill>
-                  <a:srgbClr val="004289"/>
-                </a:solidFill>
-                <a:latin typeface="Calibri Light"/>
-                <a:ea typeface="DejaVu Sans"/>
-              </a:rPr>
-              <a:t>Disk usage</a:t>
-            </a:r>
-            <a:endParaRPr b="0" lang="en-US" sz="2100" spc="-1" strike="noStrike">
-              <a:latin typeface="Arial"/>
-            </a:endParaRPr>
-          </a:p>
-          <a:p>
-            <a:pPr lvl="1" marL="432000" indent="-215280">
-              <a:lnSpc>
-                <a:spcPct val="90000"/>
-              </a:lnSpc>
-              <a:spcBef>
-                <a:spcPts val="751"/>
-              </a:spcBef>
-              <a:buClr>
-                <a:srgbClr val="000000"/>
-              </a:buClr>
-              <a:buSzPct val="45000"/>
-              <a:buFont typeface="Wingdings" charset="2"/>
-              <a:buChar char=""/>
-            </a:pPr>
-            <a:r>
-              <a:rPr b="0" lang="en-US" sz="2100" spc="-1" strike="noStrike">
-                <a:solidFill>
-                  <a:srgbClr val="004289"/>
-                </a:solidFill>
-                <a:latin typeface="Calibri Light"/>
-                <a:ea typeface="DejaVu Sans"/>
-              </a:rPr>
-              <a:t>Network connectivity</a:t>
-            </a:r>
-            <a:endParaRPr b="0" lang="en-US" sz="2100" spc="-1" strike="noStrike">
-              <a:latin typeface="Arial"/>
-            </a:endParaRPr>
-          </a:p>
-          <a:p>
-            <a:pPr marL="171360" indent="-169560">
+            <a:pPr marL="171360" indent="-168480">
               <a:lnSpc>
                 <a:spcPct val="90000"/>
               </a:lnSpc>
@@ -8196,101 +8172,43 @@
               <a:buChar char="•"/>
             </a:pPr>
             <a:r>
-              <a:rPr b="0" lang="en-US" sz="2100" spc="-1" strike="noStrike">
+              <a:rPr b="0" lang="en-US" sz="2100" spc="-1" strike="noStrike" u="sng">
                 <a:solidFill>
-                  <a:srgbClr val="004289"/>
+                  <a:srgbClr val="0563c1"/>
                 </a:solidFill>
+                <a:uFillTx/>
                 <a:latin typeface="Calibri Light"/>
                 <a:ea typeface="DejaVu Sans"/>
-              </a:rPr>
-              <a:t>Check database health</a:t>
+                <a:hlinkClick r:id="rId4"/>
+              </a:rPr>
+              <a:t>https://git-scm.com/doc</a:t>
             </a:r>
             <a:endParaRPr b="0" lang="en-US" sz="2100" spc="-1" strike="noStrike">
               <a:latin typeface="Arial"/>
             </a:endParaRPr>
           </a:p>
           <a:p>
-            <a:pPr marL="171360" indent="-169560">
+            <a:pPr>
               <a:lnSpc>
                 <a:spcPct val="90000"/>
               </a:lnSpc>
               <a:spcBef>
                 <a:spcPts val="751"/>
               </a:spcBef>
-              <a:buClr>
-                <a:srgbClr val="004289"/>
-              </a:buClr>
-              <a:buFont typeface="Arial"/>
-              <a:buChar char="•"/>
-            </a:pPr>
-            <a:r>
-              <a:rPr b="0" lang="en-US" sz="2100" spc="-1" strike="noStrike">
-                <a:solidFill>
-                  <a:srgbClr val="004289"/>
-                </a:solidFill>
-                <a:latin typeface="Calibri Light"/>
-                <a:ea typeface="DejaVu Sans"/>
-              </a:rPr>
-              <a:t>Check services (ABIS Backend)</a:t>
-            </a:r>
+            </a:pPr>
             <a:endParaRPr b="0" lang="en-US" sz="2100" spc="-1" strike="noStrike">
               <a:latin typeface="Arial"/>
             </a:endParaRPr>
           </a:p>
           <a:p>
-            <a:pPr lvl="1" marL="432000" indent="-215280">
+            <a:pPr>
               <a:lnSpc>
                 <a:spcPct val="90000"/>
               </a:lnSpc>
               <a:spcBef>
                 <a:spcPts val="751"/>
               </a:spcBef>
-              <a:buClr>
-                <a:srgbClr val="000000"/>
-              </a:buClr>
-              <a:buSzPct val="45000"/>
-              <a:buFont typeface="Wingdings" charset="2"/>
-              <a:buChar char=""/>
-            </a:pPr>
-            <a:r>
-              <a:rPr b="0" lang="en-US" sz="2100" spc="-1" strike="noStrike">
-                <a:solidFill>
-                  <a:srgbClr val="004289"/>
-                </a:solidFill>
-                <a:latin typeface="Calibri Light"/>
-                <a:ea typeface="DejaVu Sans"/>
-              </a:rPr>
-              <a:t>Check info and metrics endpoints of services with HTTP</a:t>
-            </a:r>
-            <a:endParaRPr b="0" lang="en-US" sz="2100" spc="-1" strike="noStrike">
-              <a:latin typeface="Arial"/>
-            </a:endParaRPr>
-          </a:p>
-          <a:p>
-            <a:pPr lvl="1" marL="432000" indent="-215280">
-              <a:lnSpc>
-                <a:spcPct val="90000"/>
-              </a:lnSpc>
-              <a:spcBef>
-                <a:spcPts val="751"/>
-              </a:spcBef>
-              <a:buClr>
-                <a:srgbClr val="000000"/>
-              </a:buClr>
-              <a:buSzPct val="45000"/>
-              <a:buFont typeface="Wingdings" charset="2"/>
-              <a:buChar char=""/>
-            </a:pPr>
-            <a:r>
-              <a:rPr b="0" lang="en-US" sz="2100" spc="-1" strike="noStrike">
-                <a:solidFill>
-                  <a:srgbClr val="004289"/>
-                </a:solidFill>
-                <a:latin typeface="Calibri Light"/>
-                <a:ea typeface="DejaVu Sans"/>
-              </a:rPr>
-              <a:t>Check snmp variables of ABIS Matching Dispatcher/Satellite</a:t>
-            </a:r>
+            </a:pPr>
             <a:endParaRPr b="0" lang="en-US" sz="2100" spc="-1" strike="noStrike">
               <a:latin typeface="Arial"/>
             </a:endParaRPr>
@@ -8306,7 +8224,7 @@
         <p:spPr>
           <a:xfrm>
             <a:off x="6948360" y="182520"/>
-            <a:ext cx="2055600" cy="363240"/>
+            <a:ext cx="2054520" cy="362160"/>
           </a:xfrm>
           <a:prstGeom prst="rect">
             <a:avLst/>
@@ -8332,7 +8250,7 @@
                 <a:spcPct val="100000"/>
               </a:lnSpc>
             </a:pPr>
-            <a:fld id="{ABAD3ADE-159F-43A5-A622-8774C64CC976}" type="slidenum">
+            <a:fld id="{8F78AE75-FDF4-47EF-9792-F003EF23FE2E}" type="slidenum">
               <a:rPr b="0" lang="en-US" sz="900" spc="-1" strike="noStrike">
                 <a:solidFill>
                   <a:srgbClr val="8b93b0"/>
@@ -8357,7 +8275,7 @@
         <p:spPr>
           <a:xfrm>
             <a:off x="628560" y="365040"/>
-            <a:ext cx="7885080" cy="685800"/>
+            <a:ext cx="7884000" cy="684720"/>
           </a:xfrm>
           <a:prstGeom prst="rect">
             <a:avLst/>
@@ -8391,7 +8309,7 @@
                 <a:latin typeface="Calibri Light"/>
                 <a:ea typeface="DejaVu Sans"/>
               </a:rPr>
-              <a:t>Monitoring ABIS Backend services</a:t>
+              <a:t>References</a:t>
             </a:r>
             <a:endParaRPr b="0" lang="en-US" sz="2800" spc="-1" strike="noStrike">
               <a:latin typeface="Arial"/>
@@ -8441,8 +8359,8 @@
         </p:nvSpPr>
         <p:spPr>
           <a:xfrm>
-            <a:off x="548640" y="1097280"/>
-            <a:ext cx="7954200" cy="4160880"/>
+            <a:off x="6948360" y="182520"/>
+            <a:ext cx="2054520" cy="362160"/>
           </a:xfrm>
           <a:prstGeom prst="rect">
             <a:avLst/>
@@ -8459,177 +8377,6 @@
           <a:fontRef idx="minor"/>
         </p:style>
         <p:txBody>
-          <a:bodyPr lIns="90000" rIns="90000" tIns="45000" bIns="45000">
-            <a:noAutofit/>
-          </a:bodyPr>
-          <a:p>
-            <a:pPr marL="171360" indent="-169560">
-              <a:lnSpc>
-                <a:spcPct val="90000"/>
-              </a:lnSpc>
-              <a:spcBef>
-                <a:spcPts val="751"/>
-              </a:spcBef>
-              <a:buClr>
-                <a:srgbClr val="004289"/>
-              </a:buClr>
-              <a:buFont typeface="Arial"/>
-              <a:buChar char="•"/>
-            </a:pPr>
-            <a:r>
-              <a:rPr b="0" lang="en-US" sz="2100" spc="-1" strike="noStrike">
-                <a:solidFill>
-                  <a:srgbClr val="004289"/>
-                </a:solidFill>
-                <a:latin typeface="Calibri Light"/>
-                <a:ea typeface="DejaVu Sans"/>
-              </a:rPr>
-              <a:t>ABIS Backend documentation</a:t>
-            </a:r>
-            <a:endParaRPr b="0" lang="en-US" sz="2100" spc="-1" strike="noStrike">
-              <a:latin typeface="Arial"/>
-            </a:endParaRPr>
-          </a:p>
-          <a:p>
-            <a:pPr marL="171360" indent="-169560">
-              <a:lnSpc>
-                <a:spcPct val="90000"/>
-              </a:lnSpc>
-              <a:spcBef>
-                <a:spcPts val="751"/>
-              </a:spcBef>
-              <a:buClr>
-                <a:srgbClr val="004289"/>
-              </a:buClr>
-              <a:buFont typeface="Arial"/>
-              <a:buChar char="•"/>
-            </a:pPr>
-            <a:r>
-              <a:rPr b="0" lang="en-US" sz="2100" spc="-1" strike="noStrike">
-                <a:solidFill>
-                  <a:srgbClr val="004289"/>
-                </a:solidFill>
-                <a:latin typeface="Calibri Light"/>
-                <a:ea typeface="DejaVu Sans"/>
-              </a:rPr>
-              <a:t>https://puppet.com/docs/puppet/7/puppet_index.html</a:t>
-            </a:r>
-            <a:endParaRPr b="0" lang="en-US" sz="2100" spc="-1" strike="noStrike">
-              <a:latin typeface="Arial"/>
-            </a:endParaRPr>
-          </a:p>
-          <a:p>
-            <a:pPr marL="171360" indent="-169560">
-              <a:lnSpc>
-                <a:spcPct val="90000"/>
-              </a:lnSpc>
-              <a:spcBef>
-                <a:spcPts val="751"/>
-              </a:spcBef>
-              <a:buClr>
-                <a:srgbClr val="004289"/>
-              </a:buClr>
-              <a:buFont typeface="Arial"/>
-              <a:buChar char="•"/>
-            </a:pPr>
-            <a:r>
-              <a:rPr b="0" lang="en-US" sz="2100" spc="-1" strike="noStrike" u="sng">
-                <a:solidFill>
-                  <a:srgbClr val="0563c1"/>
-                </a:solidFill>
-                <a:uFillTx/>
-                <a:latin typeface="Calibri Light"/>
-                <a:ea typeface="DejaVu Sans"/>
-                <a:hlinkClick r:id="rId1"/>
-              </a:rPr>
-              <a:t>https://puppet.com/docs/bolt/latest/bolt.html</a:t>
-            </a:r>
-            <a:endParaRPr b="0" lang="en-US" sz="2100" spc="-1" strike="noStrike">
-              <a:latin typeface="Arial"/>
-            </a:endParaRPr>
-          </a:p>
-          <a:p>
-            <a:pPr marL="171360" indent="-169560">
-              <a:lnSpc>
-                <a:spcPct val="90000"/>
-              </a:lnSpc>
-              <a:spcBef>
-                <a:spcPts val="751"/>
-              </a:spcBef>
-              <a:buClr>
-                <a:srgbClr val="004289"/>
-              </a:buClr>
-              <a:buFont typeface="Arial"/>
-              <a:buChar char="•"/>
-            </a:pPr>
-            <a:r>
-              <a:rPr b="0" lang="en-US" sz="2100" spc="-1" strike="noStrike">
-                <a:solidFill>
-                  <a:srgbClr val="004289"/>
-                </a:solidFill>
-                <a:latin typeface="Calibri Light"/>
-                <a:ea typeface="DejaVu Sans"/>
-              </a:rPr>
-              <a:t>https://git-scm.com/doc</a:t>
-            </a:r>
-            <a:endParaRPr b="0" lang="en-US" sz="2100" spc="-1" strike="noStrike">
-              <a:latin typeface="Arial"/>
-            </a:endParaRPr>
-          </a:p>
-          <a:p>
-            <a:pPr>
-              <a:lnSpc>
-                <a:spcPct val="90000"/>
-              </a:lnSpc>
-              <a:spcBef>
-                <a:spcPts val="751"/>
-              </a:spcBef>
-            </a:pPr>
-            <a:endParaRPr b="0" lang="en-US" sz="2100" spc="-1" strike="noStrike">
-              <a:latin typeface="Arial"/>
-            </a:endParaRPr>
-          </a:p>
-          <a:p>
-            <a:pPr>
-              <a:lnSpc>
-                <a:spcPct val="90000"/>
-              </a:lnSpc>
-              <a:spcBef>
-                <a:spcPts val="751"/>
-              </a:spcBef>
-            </a:pPr>
-            <a:endParaRPr b="0" lang="en-US" sz="2100" spc="-1" strike="noStrike">
-              <a:latin typeface="Arial"/>
-            </a:endParaRPr>
-          </a:p>
-        </p:txBody>
-      </p:sp>
-      <p:sp>
-        <p:nvSpPr>
-          <p:cNvPr id="198" name="CustomShape 2"/>
-          <p:cNvSpPr/>
-          <p:nvPr/>
-        </p:nvSpPr>
-        <p:spPr>
-          <a:xfrm>
-            <a:off x="6948360" y="182520"/>
-            <a:ext cx="2055600" cy="363240"/>
-          </a:xfrm>
-          <a:prstGeom prst="rect">
-            <a:avLst/>
-          </a:prstGeom>
-          <a:noFill/>
-          <a:ln>
-            <a:noFill/>
-          </a:ln>
-        </p:spPr>
-        <p:style>
-          <a:lnRef idx="0"/>
-          <a:fillRef idx="0"/>
-          <a:effectRef idx="0"/>
-          <a:fontRef idx="minor"/>
-        </p:style>
-        <p:txBody>
           <a:bodyPr lIns="90000" rIns="90000" tIns="45000" bIns="45000" anchor="ctr">
             <a:noAutofit/>
           </a:bodyPr>
@@ -8639,7 +8386,7 @@
                 <a:spcPct val="100000"/>
               </a:lnSpc>
             </a:pPr>
-            <a:fld id="{E7FCA397-A859-4F6B-8463-474974BB5891}" type="slidenum">
+            <a:fld id="{11E3DEFC-FC7B-4C22-9033-A5F865288E6C}" type="slidenum">
               <a:rPr b="0" lang="en-US" sz="900" spc="-1" strike="noStrike">
                 <a:solidFill>
                   <a:srgbClr val="8b93b0"/>
@@ -8650,57 +8397,6 @@
               <a:t>1</a:t>
             </a:fld>
             <a:endParaRPr b="0" lang="en-US" sz="900" spc="-1" strike="noStrike">
-              <a:latin typeface="Arial"/>
-            </a:endParaRPr>
-          </a:p>
-        </p:txBody>
-      </p:sp>
-      <p:sp>
-        <p:nvSpPr>
-          <p:cNvPr id="199" name="CustomShape 3"/>
-          <p:cNvSpPr/>
-          <p:nvPr/>
-        </p:nvSpPr>
-        <p:spPr>
-          <a:xfrm>
-            <a:off x="628560" y="365040"/>
-            <a:ext cx="7885080" cy="685800"/>
-          </a:xfrm>
-          <a:prstGeom prst="rect">
-            <a:avLst/>
-          </a:prstGeom>
-          <a:noFill/>
-          <a:ln>
-            <a:noFill/>
-          </a:ln>
-        </p:spPr>
-        <p:style>
-          <a:lnRef idx="0"/>
-          <a:fillRef idx="0"/>
-          <a:effectRef idx="0"/>
-          <a:fontRef idx="minor"/>
-        </p:style>
-        <p:txBody>
-          <a:bodyPr lIns="90000" rIns="90000" tIns="45000" bIns="45000" anchor="ctr">
-            <a:noAutofit/>
-          </a:bodyPr>
-          <a:p>
-            <a:pPr>
-              <a:lnSpc>
-                <a:spcPct val="90000"/>
-              </a:lnSpc>
-            </a:pPr>
-            <a:r>
-              <a:rPr b="0" lang="en-US" sz="2800" spc="-1" strike="noStrike">
-                <a:solidFill>
-                  <a:srgbClr val="004289"/>
-                </a:solidFill>
-                <a:latin typeface="Calibri Light"/>
-                <a:ea typeface="DejaVu Sans"/>
-              </a:rPr>
-              <a:t>References</a:t>
-            </a:r>
-            <a:endParaRPr b="0" lang="en-US" sz="2800" spc="-1" strike="noStrike">
               <a:latin typeface="Arial"/>
             </a:endParaRPr>
           </a:p>
@@ -8742,14 +8438,14 @@
       </p:grpSpPr>
       <p:sp>
         <p:nvSpPr>
-          <p:cNvPr id="200" name="CustomShape 1"/>
+          <p:cNvPr id="198" name="CustomShape 1"/>
           <p:cNvSpPr/>
           <p:nvPr/>
         </p:nvSpPr>
         <p:spPr>
           <a:xfrm>
             <a:off x="6948360" y="182520"/>
-            <a:ext cx="2055600" cy="363240"/>
+            <a:ext cx="2054520" cy="362160"/>
           </a:xfrm>
           <a:prstGeom prst="rect">
             <a:avLst/>
@@ -8775,7 +8471,7 @@
                 <a:spcPct val="100000"/>
               </a:lnSpc>
             </a:pPr>
-            <a:fld id="{BA586EEE-6185-4D61-AABE-875E4FC75C37}" type="slidenum">
+            <a:fld id="{7E7FCF3E-2A1C-4A98-836A-6EC86E0421B6}" type="slidenum">
               <a:rPr b="0" lang="en-US" sz="900" spc="-1" strike="noStrike">
                 <a:solidFill>
                   <a:srgbClr val="8b93b0"/>
@@ -8791,50 +8487,16 @@
           </a:p>
         </p:txBody>
       </p:sp>
-    </p:spTree>
-  </p:cSld>
-  <mc:AlternateContent>
-    <mc:Choice Requires="p14">
-      <p:transition spd="med" p14:dur="700">
-        <p:fade/>
-      </p:transition>
-    </mc:Choice>
-    <mc:Fallback>
-      <p:transition spd="med">
-        <p:fade/>
-      </p:transition>
-    </mc:Fallback>
-  </mc:AlternateContent>
-</p:sld>
-</file>
-
-<file path=ppt/slides/slide14.xml><?xml version="1.0" encoding="utf-8"?>
-<p:sld xmlns:a="http://schemas.openxmlformats.org/drawingml/2006/main" xmlns:p="http://schemas.openxmlformats.org/presentationml/2006/main" xmlns:r="http://schemas.openxmlformats.org/officeDocument/2006/relationships" xmlns:p14="http://schemas.microsoft.com/office/powerpoint/2010/main" xmlns:p15="http://schemas.microsoft.com/office/powerpoint/2012/main" xmlns:mc="http://schemas.openxmlformats.org/markup-compatibility/2006">
-  <p:cSld>
-    <p:spTree>
-      <p:nvGrpSpPr>
-        <p:cNvPr id="1" name=""/>
-        <p:cNvGrpSpPr/>
-        <p:nvPr/>
-      </p:nvGrpSpPr>
-      <p:grpSpPr>
-        <a:xfrm>
-          <a:off x="0" y="0"/>
-          <a:ext cx="0" cy="0"/>
-          <a:chOff x="0" y="0"/>
-          <a:chExt cx="0" cy="0"/>
-        </a:xfrm>
-      </p:grpSpPr>
-      <p:sp>
-        <p:nvSpPr>
-          <p:cNvPr id="201" name="CustomShape 1"/>
+      <p:sp>
+        <p:nvSpPr>
+          <p:cNvPr id="199" name="CustomShape 2"/>
           <p:cNvSpPr/>
           <p:nvPr/>
         </p:nvSpPr>
         <p:spPr>
           <a:xfrm>
-            <a:off x="6948360" y="182520"/>
-            <a:ext cx="2055600" cy="363240"/>
+            <a:off x="630000" y="836640"/>
+            <a:ext cx="6387480" cy="713880"/>
           </a:xfrm>
           <a:prstGeom prst="rect">
             <a:avLst/>
@@ -8850,68 +8512,17 @@
           <a:effectRef idx="0"/>
           <a:fontRef idx="minor"/>
         </p:style>
-        <p:txBody>
-          <a:bodyPr lIns="90000" rIns="90000" tIns="45000" bIns="45000" anchor="ctr">
-            <a:noAutofit/>
-          </a:bodyPr>
-          <a:p>
-            <a:pPr algn="r">
-              <a:lnSpc>
-                <a:spcPct val="100000"/>
-              </a:lnSpc>
-            </a:pPr>
-            <a:fld id="{3B1786E0-D5B5-48BC-8A6F-DE4F1ED9735B}" type="slidenum">
-              <a:rPr b="0" lang="en-US" sz="900" spc="-1" strike="noStrike">
-                <a:solidFill>
-                  <a:srgbClr val="8b93b0"/>
-                </a:solidFill>
-                <a:latin typeface="Calibri Light"/>
-                <a:ea typeface="DejaVu Sans"/>
-              </a:rPr>
-              <a:t>1</a:t>
-            </a:fld>
-            <a:endParaRPr b="0" lang="en-US" sz="900" spc="-1" strike="noStrike">
-              <a:latin typeface="Arial"/>
-            </a:endParaRPr>
-          </a:p>
-        </p:txBody>
-      </p:sp>
-      <p:sp>
-        <p:nvSpPr>
-          <p:cNvPr id="202" name="CustomShape 2"/>
+      </p:sp>
+      <p:sp>
+        <p:nvSpPr>
+          <p:cNvPr id="200" name="CustomShape 3"/>
           <p:cNvSpPr/>
           <p:nvPr/>
         </p:nvSpPr>
         <p:spPr>
           <a:xfrm>
-            <a:off x="630000" y="836640"/>
-            <a:ext cx="6388560" cy="714960"/>
-          </a:xfrm>
-          <a:prstGeom prst="rect">
-            <a:avLst/>
-          </a:prstGeom>
-          <a:noFill/>
-          <a:ln>
-            <a:noFill/>
-          </a:ln>
-        </p:spPr>
-        <p:style>
-          <a:lnRef idx="0"/>
-          <a:fillRef idx="0"/>
-          <a:effectRef idx="0"/>
-          <a:fontRef idx="minor"/>
-        </p:style>
-      </p:sp>
-      <p:sp>
-        <p:nvSpPr>
-          <p:cNvPr id="203" name="CustomShape 3"/>
-          <p:cNvSpPr/>
-          <p:nvPr/>
-        </p:nvSpPr>
-        <p:spPr>
-          <a:xfrm>
             <a:off x="630000" y="1989000"/>
-            <a:ext cx="3220200" cy="1646280"/>
+            <a:ext cx="3219120" cy="1645200"/>
           </a:xfrm>
           <a:prstGeom prst="rect">
             <a:avLst/>
@@ -8971,7 +8582,7 @@
         <p:spPr>
           <a:xfrm>
             <a:off x="594360" y="1188720"/>
-            <a:ext cx="6171120" cy="3886560"/>
+            <a:ext cx="6170040" cy="3885480"/>
           </a:xfrm>
           <a:prstGeom prst="rect">
             <a:avLst/>
@@ -8992,7 +8603,7 @@
             <a:noAutofit/>
           </a:bodyPr>
           <a:p>
-            <a:pPr marL="171360" indent="-169560">
+            <a:pPr marL="171360" indent="-168480">
               <a:lnSpc>
                 <a:spcPct val="90000"/>
               </a:lnSpc>
@@ -9013,14 +8624,27 @@
                 <a:latin typeface="Calibri Light"/>
                 <a:ea typeface="DejaVu Sans"/>
               </a:rPr>
-              <a:t>Deployment tools</a:t>
+              <a:t>Deployment Werkzeuge</a:t>
             </a:r>
             <a:endParaRPr b="0" lang="en-US" sz="2100" spc="-1" strike="noStrike">
               <a:latin typeface="Arial"/>
             </a:endParaRPr>
           </a:p>
           <a:p>
-            <a:pPr marL="171360" indent="-169560">
+            <a:pPr>
+              <a:lnSpc>
+                <a:spcPct val="90000"/>
+              </a:lnSpc>
+              <a:spcBef>
+                <a:spcPts val="751"/>
+              </a:spcBef>
+            </a:pPr>
+            <a:endParaRPr b="0" lang="en-US" sz="2100" spc="-1" strike="noStrike">
+              <a:latin typeface="Arial"/>
+            </a:endParaRPr>
+          </a:p>
+          <a:p>
+            <a:pPr marL="171360" indent="-168480">
               <a:lnSpc>
                 <a:spcPct val="90000"/>
               </a:lnSpc>
@@ -9041,14 +8665,27 @@
                 <a:latin typeface="Calibri Light"/>
                 <a:ea typeface="DejaVu Sans"/>
               </a:rPr>
-              <a:t>Managing configuration data</a:t>
+              <a:t>Verwaltung von Konfigurationsdaten</a:t>
             </a:r>
             <a:endParaRPr b="0" lang="en-US" sz="2100" spc="-1" strike="noStrike">
               <a:latin typeface="Arial"/>
             </a:endParaRPr>
           </a:p>
           <a:p>
-            <a:pPr marL="171360" indent="-169560">
+            <a:pPr>
+              <a:lnSpc>
+                <a:spcPct val="90000"/>
+              </a:lnSpc>
+              <a:spcBef>
+                <a:spcPts val="751"/>
+              </a:spcBef>
+            </a:pPr>
+            <a:endParaRPr b="0" lang="en-US" sz="2100" spc="-1" strike="noStrike">
+              <a:latin typeface="Arial"/>
+            </a:endParaRPr>
+          </a:p>
+          <a:p>
+            <a:pPr marL="171360" indent="-168480">
               <a:lnSpc>
                 <a:spcPct val="90000"/>
               </a:lnSpc>
@@ -9076,7 +8713,20 @@
             </a:endParaRPr>
           </a:p>
           <a:p>
-            <a:pPr marL="171360" indent="-169560">
+            <a:pPr>
+              <a:lnSpc>
+                <a:spcPct val="90000"/>
+              </a:lnSpc>
+              <a:spcBef>
+                <a:spcPts val="751"/>
+              </a:spcBef>
+            </a:pPr>
+            <a:endParaRPr b="0" lang="en-US" sz="2100" spc="-1" strike="noStrike">
+              <a:latin typeface="Arial"/>
+            </a:endParaRPr>
+          </a:p>
+          <a:p>
+            <a:pPr marL="171360" indent="-168480">
               <a:lnSpc>
                 <a:spcPct val="90000"/>
               </a:lnSpc>
@@ -9097,36 +8747,21 @@
                 <a:latin typeface="Calibri Light"/>
                 <a:ea typeface="DejaVu Sans"/>
               </a:rPr>
-              <a:t>Reconfiguration</a:t>
+              <a:t>Monitoring</a:t>
             </a:r>
             <a:endParaRPr b="0" lang="en-US" sz="2100" spc="-1" strike="noStrike">
               <a:latin typeface="Arial"/>
             </a:endParaRPr>
           </a:p>
           <a:p>
-            <a:pPr marL="171360" indent="-169560">
+            <a:pPr>
               <a:lnSpc>
                 <a:spcPct val="90000"/>
               </a:lnSpc>
               <a:spcBef>
                 <a:spcPts val="751"/>
               </a:spcBef>
-              <a:buClr>
-                <a:srgbClr val="004289"/>
-              </a:buClr>
-              <a:buFont typeface="Arial"/>
-              <a:buChar char="•"/>
-            </a:pPr>
-            <a:r>
-              <a:rPr b="0" lang="en-US" sz="2100" spc="-1" strike="noStrike">
-                <a:solidFill>
-                  <a:srgbClr val="004289"/>
-                </a:solidFill>
-                <a:latin typeface="Calibri Light"/>
-                <a:ea typeface="DejaVu Sans"/>
-              </a:rPr>
-              <a:t>Monitoring</a:t>
-            </a:r>
+            </a:pPr>
             <a:endParaRPr b="0" lang="en-US" sz="2100" spc="-1" strike="noStrike">
               <a:latin typeface="Arial"/>
             </a:endParaRPr>
@@ -9144,19 +8779,6 @@
               <a:latin typeface="Arial"/>
             </a:endParaRPr>
           </a:p>
-          <a:p>
-            <a:pPr>
-              <a:lnSpc>
-                <a:spcPct val="90000"/>
-              </a:lnSpc>
-              <a:spcBef>
-                <a:spcPts val="751"/>
-              </a:spcBef>
-            </a:pPr>
-            <a:endParaRPr b="0" lang="en-US" sz="2100" spc="-1" strike="noStrike">
-              <a:latin typeface="Arial"/>
-            </a:endParaRPr>
-          </a:p>
         </p:txBody>
       </p:sp>
       <p:sp>
@@ -9168,7 +8790,7 @@
         <p:spPr>
           <a:xfrm>
             <a:off x="6948360" y="182520"/>
-            <a:ext cx="2055600" cy="363240"/>
+            <a:ext cx="2054520" cy="362160"/>
           </a:xfrm>
           <a:prstGeom prst="rect">
             <a:avLst/>
@@ -9194,7 +8816,7 @@
                 <a:spcPct val="100000"/>
               </a:lnSpc>
             </a:pPr>
-            <a:fld id="{C22B1DEF-6C9E-45D3-85E5-226A7C3692DF}" type="slidenum">
+            <a:fld id="{9EB87A2F-A316-49E4-A306-6A3C3924D98A}" type="slidenum">
               <a:rPr b="0" lang="en-US" sz="900" spc="-1" strike="noStrike">
                 <a:solidFill>
                   <a:srgbClr val="8b93b0"/>
@@ -9219,7 +8841,7 @@
         <p:spPr>
           <a:xfrm>
             <a:off x="628560" y="365040"/>
-            <a:ext cx="7885080" cy="685800"/>
+            <a:ext cx="7884000" cy="684720"/>
           </a:xfrm>
           <a:prstGeom prst="rect">
             <a:avLst/>
@@ -9304,7 +8926,7 @@
         <p:spPr>
           <a:xfrm>
             <a:off x="777240" y="1188720"/>
-            <a:ext cx="7817040" cy="4570920"/>
+            <a:ext cx="7815960" cy="4569840"/>
           </a:xfrm>
           <a:prstGeom prst="rect">
             <a:avLst/>
@@ -9325,7 +8947,7 @@
             <a:noAutofit/>
           </a:bodyPr>
           <a:p>
-            <a:pPr marL="171360" indent="-169560">
+            <a:pPr marL="171360" indent="-168480">
               <a:lnSpc>
                 <a:spcPct val="90000"/>
               </a:lnSpc>
@@ -9346,85 +8968,27 @@
                 <a:latin typeface="Calibri Light"/>
                 <a:ea typeface="DejaVu Sans"/>
               </a:rPr>
-              <a:t>Puppet on target hosts</a:t>
+              <a:t>Ansible </a:t>
             </a:r>
             <a:endParaRPr b="0" lang="en-US" sz="2100" spc="-1" strike="noStrike">
               <a:latin typeface="Arial"/>
             </a:endParaRPr>
           </a:p>
           <a:p>
-            <a:pPr lvl="1" marL="432000" indent="-214920">
+            <a:pPr>
               <a:lnSpc>
                 <a:spcPct val="90000"/>
               </a:lnSpc>
               <a:spcBef>
                 <a:spcPts val="751"/>
               </a:spcBef>
-              <a:buClr>
-                <a:srgbClr val="000000"/>
-              </a:buClr>
-              <a:buSzPct val="45000"/>
-              <a:buFont typeface="Wingdings" charset="2"/>
-              <a:buChar char=""/>
-            </a:pPr>
-            <a:r>
-              <a:rPr b="0" lang="en-US" sz="2100" spc="-1" strike="noStrike">
-                <a:solidFill>
-                  <a:srgbClr val="004289"/>
-                </a:solidFill>
-                <a:latin typeface="Calibri Light"/>
-                <a:ea typeface="DejaVu Sans"/>
-              </a:rPr>
-              <a:t>Install packages</a:t>
-            </a:r>
+            </a:pPr>
             <a:endParaRPr b="0" lang="en-US" sz="2100" spc="-1" strike="noStrike">
               <a:latin typeface="Arial"/>
             </a:endParaRPr>
           </a:p>
           <a:p>
-            <a:pPr lvl="1" marL="432000" indent="-214920">
-              <a:lnSpc>
-                <a:spcPct val="90000"/>
-              </a:lnSpc>
-              <a:spcBef>
-                <a:spcPts val="751"/>
-              </a:spcBef>
-              <a:buClr>
-                <a:srgbClr val="000000"/>
-              </a:buClr>
-              <a:buSzPct val="45000"/>
-              <a:buFont typeface="Wingdings" charset="2"/>
-              <a:buChar char=""/>
-            </a:pPr>
-            <a:r>
-              <a:rPr b="0" lang="en-US" sz="2100" spc="-1" strike="noStrike">
-                <a:solidFill>
-                  <a:srgbClr val="004289"/>
-                </a:solidFill>
-                <a:latin typeface="Calibri Light"/>
-                <a:ea typeface="DejaVu Sans"/>
-              </a:rPr>
-              <a:t>Apply configuration changes</a:t>
-            </a:r>
-            <a:endParaRPr b="0" lang="en-US" sz="2100" spc="-1" strike="noStrike">
-              <a:latin typeface="Arial"/>
-            </a:endParaRPr>
-          </a:p>
-          <a:p>
-            <a:pPr>
-              <a:lnSpc>
-                <a:spcPct val="90000"/>
-              </a:lnSpc>
-              <a:spcBef>
-                <a:spcPts val="751"/>
-              </a:spcBef>
-            </a:pPr>
-            <a:endParaRPr b="0" lang="en-US" sz="2100" spc="-1" strike="noStrike">
-              <a:latin typeface="Arial"/>
-            </a:endParaRPr>
-          </a:p>
-          <a:p>
-            <a:pPr marL="171360" indent="-169560">
+            <a:pPr marL="171360" indent="-168480">
               <a:lnSpc>
                 <a:spcPct val="90000"/>
               </a:lnSpc>
@@ -9445,56 +9009,27 @@
                 <a:latin typeface="Calibri Light"/>
                 <a:ea typeface="DejaVu Sans"/>
               </a:rPr>
-              <a:t>Puppet Bolt (Windows, Linux) on deployment host</a:t>
+              <a:t>Puppet / Puppet Bolt</a:t>
             </a:r>
             <a:endParaRPr b="0" lang="en-US" sz="2100" spc="-1" strike="noStrike">
               <a:latin typeface="Arial"/>
             </a:endParaRPr>
           </a:p>
           <a:p>
-            <a:pPr lvl="1" marL="432000" indent="-214920">
+            <a:pPr>
               <a:lnSpc>
                 <a:spcPct val="90000"/>
               </a:lnSpc>
               <a:spcBef>
                 <a:spcPts val="751"/>
               </a:spcBef>
-              <a:buClr>
-                <a:srgbClr val="000000"/>
-              </a:buClr>
-              <a:buSzPct val="45000"/>
-              <a:buFont typeface="Wingdings" charset="2"/>
-              <a:buChar char=""/>
-            </a:pPr>
-            <a:r>
-              <a:rPr b="0" lang="en-US" sz="2100" spc="-1" strike="noStrike">
-                <a:solidFill>
-                  <a:srgbClr val="004289"/>
-                </a:solidFill>
-                <a:latin typeface="Calibri Light"/>
-                <a:ea typeface="DejaVu Sans"/>
-              </a:rPr>
-              <a:t>Execute commands, tasks, plans on target hosts</a:t>
-            </a:r>
+            </a:pPr>
             <a:endParaRPr b="0" lang="en-US" sz="2100" spc="-1" strike="noStrike">
               <a:latin typeface="Arial"/>
             </a:endParaRPr>
           </a:p>
           <a:p>
-            <a:pPr>
-              <a:lnSpc>
-                <a:spcPct val="90000"/>
-              </a:lnSpc>
-              <a:spcBef>
-                <a:spcPts val="751"/>
-              </a:spcBef>
-            </a:pPr>
-            <a:endParaRPr b="0" lang="en-US" sz="2100" spc="-1" strike="noStrike">
-              <a:latin typeface="Arial"/>
-            </a:endParaRPr>
-          </a:p>
-          <a:p>
-            <a:pPr marL="171360" indent="-169560">
+            <a:pPr marL="171360" indent="-168480">
               <a:lnSpc>
                 <a:spcPct val="90000"/>
               </a:lnSpc>
@@ -9515,62 +9050,20 @@
                 <a:latin typeface="Calibri Light"/>
                 <a:ea typeface="DejaVu Sans"/>
               </a:rPr>
-              <a:t>Git (optional) on deployment host</a:t>
+              <a:t>Versionsverwaltung (VCS)</a:t>
             </a:r>
             <a:endParaRPr b="0" lang="en-US" sz="2100" spc="-1" strike="noStrike">
               <a:latin typeface="Arial"/>
             </a:endParaRPr>
           </a:p>
           <a:p>
-            <a:pPr lvl="1" marL="432000" indent="-214920">
+            <a:pPr>
               <a:lnSpc>
                 <a:spcPct val="90000"/>
               </a:lnSpc>
               <a:spcBef>
                 <a:spcPts val="751"/>
               </a:spcBef>
-              <a:buClr>
-                <a:srgbClr val="000000"/>
-              </a:buClr>
-              <a:buSzPct val="45000"/>
-              <a:buFont typeface="Wingdings" charset="2"/>
-              <a:buChar char=""/>
-            </a:pPr>
-            <a:r>
-              <a:rPr b="0" lang="en-US" sz="2100" spc="-1" strike="noStrike">
-                <a:solidFill>
-                  <a:srgbClr val="004289"/>
-                </a:solidFill>
-                <a:latin typeface="Calibri Light"/>
-                <a:ea typeface="DejaVu Sans"/>
-              </a:rPr>
-              <a:t>Manage environment specific versioned configuration data</a:t>
-            </a:r>
-            <a:endParaRPr b="0" lang="en-US" sz="2100" spc="-1" strike="noStrike">
-              <a:latin typeface="Arial"/>
-            </a:endParaRPr>
-          </a:p>
-          <a:p>
-            <a:pPr>
-              <a:lnSpc>
-                <a:spcPct val="90000"/>
-              </a:lnSpc>
-              <a:spcBef>
-                <a:spcPts val="751"/>
-              </a:spcBef>
-            </a:pPr>
-            <a:endParaRPr b="0" lang="en-US" sz="2100" spc="-1" strike="noStrike">
-              <a:latin typeface="Arial"/>
-            </a:endParaRPr>
-          </a:p>
-          <a:p>
-            <a:pPr>
-              <a:lnSpc>
-                <a:spcPct val="90000"/>
-              </a:lnSpc>
-              <a:spcBef>
-                <a:spcPts val="751"/>
-              </a:spcBef>
             </a:pPr>
             <a:endParaRPr b="0" lang="en-US" sz="2100" spc="-1" strike="noStrike">
               <a:latin typeface="Arial"/>
@@ -9587,7 +9080,7 @@
         <p:spPr>
           <a:xfrm>
             <a:off x="6948360" y="182520"/>
-            <a:ext cx="2055600" cy="363240"/>
+            <a:ext cx="2054520" cy="362160"/>
           </a:xfrm>
           <a:prstGeom prst="rect">
             <a:avLst/>
@@ -9613,7 +9106,7 @@
                 <a:spcPct val="100000"/>
               </a:lnSpc>
             </a:pPr>
-            <a:fld id="{D167D614-A78F-4419-92AE-088C3426B90A}" type="slidenum">
+            <a:fld id="{8A03F51A-7FA1-4DA6-81AB-D149CA6F1400}" type="slidenum">
               <a:rPr b="0" lang="en-US" sz="900" spc="-1" strike="noStrike">
                 <a:solidFill>
                   <a:srgbClr val="8b93b0"/>
@@ -9638,7 +9131,7 @@
         <p:spPr>
           <a:xfrm>
             <a:off x="628560" y="365040"/>
-            <a:ext cx="7885080" cy="685800"/>
+            <a:ext cx="7884000" cy="684720"/>
           </a:xfrm>
           <a:prstGeom prst="rect">
             <a:avLst/>
@@ -9672,7 +9165,7 @@
                 <a:latin typeface="Calibri Light"/>
                 <a:ea typeface="DejaVu Sans"/>
               </a:rPr>
-              <a:t>Deployment tools</a:t>
+              <a:t>Deployment Werkzeuge</a:t>
             </a:r>
             <a:endParaRPr b="0" lang="en-US" sz="2800" spc="-1" strike="noStrike">
               <a:latin typeface="Arial"/>
@@ -9723,7 +9216,7 @@
         <p:spPr>
           <a:xfrm>
             <a:off x="777240" y="1188720"/>
-            <a:ext cx="7817040" cy="4570920"/>
+            <a:ext cx="7815960" cy="4569840"/>
           </a:xfrm>
           <a:prstGeom prst="rect">
             <a:avLst/>
@@ -9744,7 +9237,7 @@
             <a:noAutofit/>
           </a:bodyPr>
           <a:p>
-            <a:pPr marL="171360" indent="-169560">
+            <a:pPr marL="171360" indent="-168480">
               <a:lnSpc>
                 <a:spcPct val="90000"/>
               </a:lnSpc>
@@ -9765,14 +9258,25 @@
                 <a:latin typeface="Calibri Light"/>
                 <a:ea typeface="DejaVu Sans"/>
               </a:rPr>
-              <a:t>Automation and management of infrastructure</a:t>
+              <a:t>Agent Modus, lokaler Modus</a:t>
+            </a:r>
+            <a:br/>
+            <a:r>
+              <a:rPr b="0" lang="en-US" sz="2100" spc="-1" strike="noStrike">
+                <a:solidFill>
+                  <a:srgbClr val="004289"/>
+                </a:solidFill>
+                <a:latin typeface="Calibri Light"/>
+                <a:ea typeface="DejaVu Sans"/>
+              </a:rPr>
+              <a:t> </a:t>
             </a:r>
             <a:endParaRPr b="0" lang="en-US" sz="2100" spc="-1" strike="noStrike">
               <a:latin typeface="Arial"/>
             </a:endParaRPr>
           </a:p>
           <a:p>
-            <a:pPr marL="171360" indent="-169560">
+            <a:pPr marL="171360" indent="-168480">
               <a:lnSpc>
                 <a:spcPct val="90000"/>
               </a:lnSpc>
@@ -9793,53 +9297,14 @@
                 <a:latin typeface="Calibri Light"/>
                 <a:ea typeface="DejaVu Sans"/>
               </a:rPr>
-              <a:t>Agent mode, local mode</a:t>
-            </a:r>
-            <a:br/>
-            <a:r>
-              <a:rPr b="0" lang="en-US" sz="2100" spc="-1" strike="noStrike">
-                <a:solidFill>
-                  <a:srgbClr val="004289"/>
-                </a:solidFill>
-                <a:latin typeface="Calibri Light"/>
-                <a:ea typeface="DejaVu Sans"/>
-              </a:rPr>
-              <a:t> </a:t>
+              <a:t>Puppet Umgebung</a:t>
             </a:r>
             <a:endParaRPr b="0" lang="en-US" sz="2100" spc="-1" strike="noStrike">
               <a:latin typeface="Arial"/>
             </a:endParaRPr>
           </a:p>
           <a:p>
-            <a:pPr marL="171360" indent="-169560">
-              <a:lnSpc>
-                <a:spcPct val="90000"/>
-              </a:lnSpc>
-              <a:spcBef>
-                <a:spcPts val="751"/>
-              </a:spcBef>
-              <a:buClr>
-                <a:srgbClr val="004289"/>
-              </a:buClr>
-              <a:buFont typeface="Arial"/>
-              <a:buChar char="•"/>
-            </a:pPr>
-            <a:r>
-              <a:rPr b="0" lang="en-US" sz="2100" spc="-1" strike="noStrike">
-                <a:solidFill>
-                  <a:srgbClr val="004289"/>
-                </a:solidFill>
-                <a:latin typeface="Calibri Light"/>
-                <a:ea typeface="DejaVu Sans"/>
-              </a:rPr>
-              <a:t>Puppet environment</a:t>
-            </a:r>
-            <a:endParaRPr b="0" lang="en-US" sz="2100" spc="-1" strike="noStrike">
-              <a:latin typeface="Arial"/>
-            </a:endParaRPr>
-          </a:p>
-          <a:p>
-            <a:pPr lvl="1" marL="432000" indent="-214920">
+            <a:pPr lvl="1" marL="432000" indent="-213840">
               <a:lnSpc>
                 <a:spcPct val="90000"/>
               </a:lnSpc>
@@ -9861,14 +9326,14 @@
                 <a:latin typeface="Calibri Light"/>
                 <a:ea typeface="DejaVu Sans"/>
               </a:rPr>
-              <a:t>Modules</a:t>
+              <a:t>Verzeichnis enthält Module</a:t>
             </a:r>
             <a:endParaRPr b="0" lang="en-US" sz="2100" spc="-1" strike="noStrike">
               <a:latin typeface="Arial"/>
             </a:endParaRPr>
           </a:p>
           <a:p>
-            <a:pPr lvl="1" marL="432000" indent="-214920">
+            <a:pPr lvl="1" marL="432000" indent="-213840">
               <a:lnSpc>
                 <a:spcPct val="90000"/>
               </a:lnSpc>
@@ -9890,7 +9355,7 @@
                 <a:latin typeface="Calibri Light"/>
                 <a:ea typeface="DejaVu Sans"/>
               </a:rPr>
-              <a:t>Data</a:t>
+              <a:t>Und Daten</a:t>
             </a:r>
             <a:br/>
             <a:r>
@@ -9908,7 +9373,7 @@
             </a:endParaRPr>
           </a:p>
           <a:p>
-            <a:pPr marL="171360" indent="-169560">
+            <a:pPr marL="171360" indent="-168480">
               <a:lnSpc>
                 <a:spcPct val="90000"/>
               </a:lnSpc>
@@ -9929,14 +9394,14 @@
                 <a:latin typeface="Calibri Light"/>
                 <a:ea typeface="DejaVu Sans"/>
               </a:rPr>
-              <a:t>Modules managing aspects of target systems</a:t>
+              <a:t>Modul verwaltet Teile des Zielsystems (z.B. einenDienst)</a:t>
             </a:r>
             <a:endParaRPr b="0" lang="en-US" sz="2100" spc="-1" strike="noStrike">
               <a:latin typeface="Arial"/>
             </a:endParaRPr>
           </a:p>
           <a:p>
-            <a:pPr lvl="1" marL="432000" indent="-214920">
+            <a:pPr lvl="1" marL="432000" indent="-213840">
               <a:lnSpc>
                 <a:spcPct val="90000"/>
               </a:lnSpc>
@@ -9958,14 +9423,14 @@
                 <a:latin typeface="Calibri Light"/>
                 <a:ea typeface="DejaVu Sans"/>
               </a:rPr>
-              <a:t>Manifests</a:t>
+              <a:t>Manifests </a:t>
             </a:r>
             <a:endParaRPr b="0" lang="en-US" sz="2100" spc="-1" strike="noStrike">
               <a:latin typeface="Arial"/>
             </a:endParaRPr>
           </a:p>
           <a:p>
-            <a:pPr lvl="1" marL="432000" indent="-214920">
+            <a:pPr lvl="1" marL="432000" indent="-213840">
               <a:lnSpc>
                 <a:spcPct val="90000"/>
               </a:lnSpc>
@@ -9994,7 +9459,7 @@
             </a:endParaRPr>
           </a:p>
           <a:p>
-            <a:pPr lvl="1" marL="432000" indent="-214920">
+            <a:pPr lvl="1" marL="432000" indent="-213840">
               <a:lnSpc>
                 <a:spcPct val="90000"/>
               </a:lnSpc>
@@ -10023,7 +9488,7 @@
             </a:endParaRPr>
           </a:p>
           <a:p>
-            <a:pPr lvl="1" marL="432000" indent="-214920">
+            <a:pPr lvl="1" marL="432000" indent="-213840">
               <a:lnSpc>
                 <a:spcPct val="90000"/>
               </a:lnSpc>
@@ -10101,7 +9566,7 @@
         <p:spPr>
           <a:xfrm>
             <a:off x="6948360" y="182520"/>
-            <a:ext cx="2055600" cy="363240"/>
+            <a:ext cx="2054520" cy="362160"/>
           </a:xfrm>
           <a:prstGeom prst="rect">
             <a:avLst/>
@@ -10127,7 +9592,7 @@
                 <a:spcPct val="100000"/>
               </a:lnSpc>
             </a:pPr>
-            <a:fld id="{ED303456-036E-4BCF-81D5-C1D9F571E8F1}" type="slidenum">
+            <a:fld id="{E3732AC6-9879-409A-9184-152822858113}" type="slidenum">
               <a:rPr b="0" lang="en-US" sz="900" spc="-1" strike="noStrike">
                 <a:solidFill>
                   <a:srgbClr val="8b93b0"/>
@@ -10152,7 +9617,7 @@
         <p:spPr>
           <a:xfrm>
             <a:off x="628560" y="365040"/>
-            <a:ext cx="7885080" cy="685800"/>
+            <a:ext cx="7884000" cy="684720"/>
           </a:xfrm>
           <a:prstGeom prst="rect">
             <a:avLst/>
@@ -10237,7 +9702,7 @@
         <p:spPr>
           <a:xfrm>
             <a:off x="548640" y="1097280"/>
-            <a:ext cx="8045640" cy="4160880"/>
+            <a:ext cx="8044560" cy="4159800"/>
           </a:xfrm>
           <a:prstGeom prst="rect">
             <a:avLst/>
@@ -10258,7 +9723,7 @@
             <a:noAutofit/>
           </a:bodyPr>
           <a:p>
-            <a:pPr marL="171360" indent="-169560">
+            <a:pPr marL="171360" indent="-168480">
               <a:lnSpc>
                 <a:spcPct val="90000"/>
               </a:lnSpc>
@@ -10279,14 +9744,27 @@
                 <a:latin typeface="Calibri Light"/>
                 <a:ea typeface="DejaVu Sans"/>
               </a:rPr>
-              <a:t>Orchestration of work to be done on target infrastructure</a:t>
+              <a:t>Orchestrierung von Deploymentskripten</a:t>
             </a:r>
             <a:endParaRPr b="0" lang="en-US" sz="2100" spc="-1" strike="noStrike">
               <a:latin typeface="Arial"/>
             </a:endParaRPr>
           </a:p>
           <a:p>
-            <a:pPr marL="171360" indent="-169560">
+            <a:pPr>
+              <a:lnSpc>
+                <a:spcPct val="90000"/>
+              </a:lnSpc>
+              <a:spcBef>
+                <a:spcPts val="751"/>
+              </a:spcBef>
+            </a:pPr>
+            <a:endParaRPr b="0" lang="en-US" sz="2100" spc="-1" strike="noStrike">
+              <a:latin typeface="Arial"/>
+            </a:endParaRPr>
+          </a:p>
+          <a:p>
+            <a:pPr marL="171360" indent="-168480">
               <a:lnSpc>
                 <a:spcPct val="90000"/>
               </a:lnSpc>
@@ -10307,14 +9785,27 @@
                 <a:latin typeface="Calibri Light"/>
                 <a:ea typeface="DejaVu Sans"/>
               </a:rPr>
-              <a:t>Access to target nodes using ssh (Linux) or WinRM (Windows)</a:t>
+              <a:t>Verbindung zu Zielknoten per ssh (Linux) or WinRM (Windows)</a:t>
             </a:r>
             <a:endParaRPr b="0" lang="en-US" sz="2100" spc="-1" strike="noStrike">
               <a:latin typeface="Arial"/>
             </a:endParaRPr>
           </a:p>
           <a:p>
-            <a:pPr marL="171360" indent="-169560">
+            <a:pPr>
+              <a:lnSpc>
+                <a:spcPct val="90000"/>
+              </a:lnSpc>
+              <a:spcBef>
+                <a:spcPts val="751"/>
+              </a:spcBef>
+            </a:pPr>
+            <a:endParaRPr b="0" lang="en-US" sz="2100" spc="-1" strike="noStrike">
+              <a:latin typeface="Arial"/>
+            </a:endParaRPr>
+          </a:p>
+          <a:p>
+            <a:pPr marL="171360" indent="-168480">
               <a:lnSpc>
                 <a:spcPct val="90000"/>
               </a:lnSpc>
@@ -10342,36 +9833,7 @@
             </a:endParaRPr>
           </a:p>
           <a:p>
-            <a:pPr lvl="1" marL="432000" indent="-214920">
-              <a:lnSpc>
-                <a:spcPct val="90000"/>
-              </a:lnSpc>
-              <a:spcBef>
-                <a:spcPts val="751"/>
-              </a:spcBef>
-              <a:buClr>
-                <a:srgbClr val="000000"/>
-              </a:buClr>
-              <a:buSzPct val="45000"/>
-              <a:buFont typeface="Wingdings" charset="2"/>
-              <a:buChar char=""/>
-            </a:pPr>
-            <a:r>
-              <a:rPr b="0" lang="en-US" sz="2100" spc="-1" strike="noStrike">
-                <a:solidFill>
-                  <a:srgbClr val="004289"/>
-                </a:solidFill>
-                <a:latin typeface="Calibri Light"/>
-                <a:ea typeface="DejaVu Sans"/>
-              </a:rPr>
-              <a:t>For adhoc commands</a:t>
-            </a:r>
-            <a:endParaRPr b="0" lang="en-US" sz="2100" spc="-1" strike="noStrike">
-              <a:latin typeface="Arial"/>
-            </a:endParaRPr>
-          </a:p>
-          <a:p>
-            <a:pPr marL="171360" indent="-169560">
+            <a:pPr marL="171360" indent="-168480">
               <a:lnSpc>
                 <a:spcPct val="90000"/>
               </a:lnSpc>
@@ -10399,36 +9861,7 @@
             </a:endParaRPr>
           </a:p>
           <a:p>
-            <a:pPr lvl="1" marL="432000" indent="-214920">
-              <a:lnSpc>
-                <a:spcPct val="90000"/>
-              </a:lnSpc>
-              <a:spcBef>
-                <a:spcPts val="751"/>
-              </a:spcBef>
-              <a:buClr>
-                <a:srgbClr val="000000"/>
-              </a:buClr>
-              <a:buSzPct val="45000"/>
-              <a:buFont typeface="Wingdings" charset="2"/>
-              <a:buChar char=""/>
-            </a:pPr>
-            <a:r>
-              <a:rPr b="0" lang="en-US" sz="2100" spc="-1" strike="noStrike">
-                <a:solidFill>
-                  <a:srgbClr val="004289"/>
-                </a:solidFill>
-                <a:latin typeface="Calibri Light"/>
-                <a:ea typeface="DejaVu Sans"/>
-              </a:rPr>
-              <a:t>Execute script on remote host</a:t>
-            </a:r>
-            <a:endParaRPr b="0" lang="en-US" sz="2100" spc="-1" strike="noStrike">
-              <a:latin typeface="Arial"/>
-            </a:endParaRPr>
-          </a:p>
-          <a:p>
-            <a:pPr marL="171360" indent="-169560">
+            <a:pPr marL="171360" indent="-168480">
               <a:lnSpc>
                 <a:spcPct val="90000"/>
               </a:lnSpc>
@@ -10456,65 +9889,7 @@
             </a:endParaRPr>
           </a:p>
           <a:p>
-            <a:pPr lvl="1" marL="432000" indent="-214920">
-              <a:lnSpc>
-                <a:spcPct val="90000"/>
-              </a:lnSpc>
-              <a:spcBef>
-                <a:spcPts val="751"/>
-              </a:spcBef>
-              <a:buClr>
-                <a:srgbClr val="000000"/>
-              </a:buClr>
-              <a:buSzPct val="45000"/>
-              <a:buFont typeface="Wingdings" charset="2"/>
-              <a:buChar char=""/>
-            </a:pPr>
-            <a:r>
-              <a:rPr b="0" lang="en-US" sz="2100" spc="-1" strike="noStrike">
-                <a:solidFill>
-                  <a:srgbClr val="004289"/>
-                </a:solidFill>
-                <a:latin typeface="Calibri Light"/>
-                <a:ea typeface="DejaVu Sans"/>
-              </a:rPr>
-              <a:t>For running task scripts</a:t>
-            </a:r>
-            <a:endParaRPr b="0" lang="en-US" sz="2100" spc="-1" strike="noStrike">
-              <a:latin typeface="Arial"/>
-            </a:endParaRPr>
-          </a:p>
-          <a:p>
-            <a:pPr lvl="1" marL="432000" indent="-214920">
-              <a:lnSpc>
-                <a:spcPct val="90000"/>
-              </a:lnSpc>
-              <a:spcBef>
-                <a:spcPts val="751"/>
-              </a:spcBef>
-              <a:buClr>
-                <a:srgbClr val="000000"/>
-              </a:buClr>
-              <a:buSzPct val="45000"/>
-              <a:buFont typeface="Wingdings" charset="2"/>
-              <a:buChar char=""/>
-            </a:pPr>
-            <a:r>
-              <a:rPr b="0" lang="en-US" sz="2100" spc="-1" strike="noStrike">
-                <a:solidFill>
-                  <a:srgbClr val="004289"/>
-                </a:solidFill>
-                <a:latin typeface="Calibri Light"/>
-                <a:ea typeface="DejaVu Sans"/>
-              </a:rPr>
-              <a:t>Tasks encapsulate commands and/or scripts</a:t>
-            </a:r>
-            <a:endParaRPr b="0" lang="en-US" sz="2100" spc="-1" strike="noStrike">
-              <a:latin typeface="Arial"/>
-            </a:endParaRPr>
-          </a:p>
-          <a:p>
-            <a:pPr marL="171360" indent="-169560">
+            <a:pPr marL="171360" indent="-168480">
               <a:lnSpc>
                 <a:spcPct val="90000"/>
               </a:lnSpc>
@@ -10542,30 +9917,14 @@
             </a:endParaRPr>
           </a:p>
           <a:p>
-            <a:pPr lvl="1" marL="432000" indent="-214920">
+            <a:pPr>
               <a:lnSpc>
                 <a:spcPct val="90000"/>
               </a:lnSpc>
               <a:spcBef>
                 <a:spcPts val="751"/>
               </a:spcBef>
-              <a:buClr>
-                <a:srgbClr val="000000"/>
-              </a:buClr>
-              <a:buSzPct val="45000"/>
-              <a:buFont typeface="Wingdings" charset="2"/>
-              <a:buChar char=""/>
-            </a:pPr>
-            <a:r>
-              <a:rPr b="0" lang="en-US" sz="2100" spc="-1" strike="noStrike">
-                <a:solidFill>
-                  <a:srgbClr val="004289"/>
-                </a:solidFill>
-                <a:latin typeface="Calibri Light"/>
-                <a:ea typeface="DejaVu Sans"/>
-              </a:rPr>
-              <a:t>For running Puppet manifests, tasks, commands, script or other plans</a:t>
-            </a:r>
+            </a:pPr>
             <a:endParaRPr b="0" lang="en-US" sz="2100" spc="-1" strike="noStrike">
               <a:latin typeface="Arial"/>
             </a:endParaRPr>
@@ -10607,7 +9966,7 @@
         <p:spPr>
           <a:xfrm>
             <a:off x="6948360" y="182520"/>
-            <a:ext cx="2055600" cy="363240"/>
+            <a:ext cx="2054520" cy="362160"/>
           </a:xfrm>
           <a:prstGeom prst="rect">
             <a:avLst/>
@@ -10633,7 +9992,7 @@
                 <a:spcPct val="100000"/>
               </a:lnSpc>
             </a:pPr>
-            <a:fld id="{4E1BD319-0C95-47C1-8C0C-2F03B7F71B02}" type="slidenum">
+            <a:fld id="{ED611280-FABE-4F44-8BED-2C69D4BD8E4E}" type="slidenum">
               <a:rPr b="0" lang="en-US" sz="900" spc="-1" strike="noStrike">
                 <a:solidFill>
                   <a:srgbClr val="8b93b0"/>
@@ -10658,7 +10017,7 @@
         <p:spPr>
           <a:xfrm>
             <a:off x="628560" y="365040"/>
-            <a:ext cx="7885080" cy="685800"/>
+            <a:ext cx="7884000" cy="684720"/>
           </a:xfrm>
           <a:prstGeom prst="rect">
             <a:avLst/>
@@ -10743,7 +10102,7 @@
         <p:spPr>
           <a:xfrm>
             <a:off x="548640" y="1097280"/>
-            <a:ext cx="7954200" cy="4160880"/>
+            <a:ext cx="8044560" cy="4159800"/>
           </a:xfrm>
           <a:prstGeom prst="rect">
             <a:avLst/>
@@ -10764,7 +10123,7 @@
             <a:noAutofit/>
           </a:bodyPr>
           <a:p>
-            <a:pPr marL="171360" indent="-169560">
+            <a:pPr marL="171360" indent="-168480">
               <a:lnSpc>
                 <a:spcPct val="90000"/>
               </a:lnSpc>
@@ -10785,14 +10144,27 @@
                 <a:latin typeface="Calibri Light"/>
                 <a:ea typeface="DejaVu Sans"/>
               </a:rPr>
-              <a:t>Follow best practices recommendations for devops</a:t>
+              <a:t>Orchestrierung von Deploymentskripten</a:t>
             </a:r>
             <a:endParaRPr b="0" lang="en-US" sz="2100" spc="-1" strike="noStrike">
               <a:latin typeface="Arial"/>
             </a:endParaRPr>
           </a:p>
           <a:p>
-            <a:pPr marL="171360" indent="-169560">
+            <a:pPr>
+              <a:lnSpc>
+                <a:spcPct val="90000"/>
+              </a:lnSpc>
+              <a:spcBef>
+                <a:spcPts val="751"/>
+              </a:spcBef>
+            </a:pPr>
+            <a:endParaRPr b="0" lang="en-US" sz="2100" spc="-1" strike="noStrike">
+              <a:latin typeface="Arial"/>
+            </a:endParaRPr>
+          </a:p>
+          <a:p>
+            <a:pPr marL="171360" indent="-168480">
               <a:lnSpc>
                 <a:spcPct val="90000"/>
               </a:lnSpc>
@@ -10813,14 +10185,27 @@
                 <a:latin typeface="Calibri Light"/>
                 <a:ea typeface="DejaVu Sans"/>
               </a:rPr>
-              <a:t>Use version control for environment specific data</a:t>
+              <a:t>Verbindung zu Zielknoten per ssh (Linux) or WinRM (Windows)</a:t>
             </a:r>
             <a:endParaRPr b="0" lang="en-US" sz="2100" spc="-1" strike="noStrike">
               <a:latin typeface="Arial"/>
             </a:endParaRPr>
           </a:p>
           <a:p>
-            <a:pPr marL="171360" indent="-169560">
+            <a:pPr>
+              <a:lnSpc>
+                <a:spcPct val="90000"/>
+              </a:lnSpc>
+              <a:spcBef>
+                <a:spcPts val="751"/>
+              </a:spcBef>
+            </a:pPr>
+            <a:endParaRPr b="0" lang="en-US" sz="2100" spc="-1" strike="noStrike">
+              <a:latin typeface="Arial"/>
+            </a:endParaRPr>
+          </a:p>
+          <a:p>
+            <a:pPr marL="171360" indent="-168480">
               <a:lnSpc>
                 <a:spcPct val="90000"/>
               </a:lnSpc>
@@ -10841,14 +10226,14 @@
                 <a:latin typeface="Calibri Light"/>
                 <a:ea typeface="DejaVu Sans"/>
               </a:rPr>
-              <a:t>Recommendation is Git</a:t>
+              <a:t>Playbooks</a:t>
             </a:r>
             <a:endParaRPr b="0" lang="en-US" sz="2100" spc="-1" strike="noStrike">
               <a:latin typeface="Arial"/>
             </a:endParaRPr>
           </a:p>
           <a:p>
-            <a:pPr marL="171360" indent="-169560">
+            <a:pPr marL="171360" indent="-168480">
               <a:lnSpc>
                 <a:spcPct val="90000"/>
               </a:lnSpc>
@@ -10869,14 +10254,42 @@
                 <a:latin typeface="Calibri Light"/>
                 <a:ea typeface="DejaVu Sans"/>
               </a:rPr>
-              <a:t>Keep a branch or repository for each target environment</a:t>
+              <a:t>Collections</a:t>
             </a:r>
             <a:endParaRPr b="0" lang="en-US" sz="2100" spc="-1" strike="noStrike">
               <a:latin typeface="Arial"/>
             </a:endParaRPr>
           </a:p>
           <a:p>
-            <a:pPr marL="171360" indent="-169560">
+            <a:pPr marL="171360" indent="-168480">
+              <a:lnSpc>
+                <a:spcPct val="90000"/>
+              </a:lnSpc>
+              <a:spcBef>
+                <a:spcPts val="751"/>
+              </a:spcBef>
+              <a:buClr>
+                <a:srgbClr val="000000"/>
+              </a:buClr>
+              <a:buFont typeface="Arial"/>
+              <a:buChar char="•"/>
+            </a:pPr>
+            <a:r>
+              <a:rPr b="0" lang="en-US" sz="2100" spc="-1" strike="noStrike">
+                <a:solidFill>
+                  <a:srgbClr val="004289"/>
+                </a:solidFill>
+                <a:latin typeface="Calibri Light"/>
+                <a:ea typeface="DejaVu Sans"/>
+              </a:rPr>
+              <a:t>Rollen</a:t>
+            </a:r>
+            <a:endParaRPr b="0" lang="en-US" sz="2100" spc="-1" strike="noStrike">
+              <a:latin typeface="Arial"/>
+            </a:endParaRPr>
+          </a:p>
+          <a:p>
+            <a:pPr marL="171360" indent="-168480">
               <a:lnSpc>
                 <a:spcPct val="90000"/>
               </a:lnSpc>
@@ -10895,10 +10308,28 @@
                   <a:srgbClr val="004289"/>
                 </a:solidFill>
                 <a:latin typeface="Calibri Light"/>
-                <a:ea typeface="Noto Sans CJK SC"/>
-              </a:rPr>
-              <a:t>Create yaml files matching the </a:t>
-            </a:r>
+                <a:ea typeface="DejaVu Sans"/>
+              </a:rPr>
+              <a:t>Tasks</a:t>
+            </a:r>
+            <a:endParaRPr b="0" lang="en-US" sz="2100" spc="-1" strike="noStrike">
+              <a:latin typeface="Arial"/>
+            </a:endParaRPr>
+          </a:p>
+          <a:p>
+            <a:pPr marL="171360" indent="-168480">
+              <a:lnSpc>
+                <a:spcPct val="90000"/>
+              </a:lnSpc>
+              <a:spcBef>
+                <a:spcPts val="751"/>
+              </a:spcBef>
+              <a:buClr>
+                <a:srgbClr val="004289"/>
+              </a:buClr>
+              <a:buFont typeface="Arial"/>
+              <a:buChar char="•"/>
+            </a:pPr>
             <a:r>
               <a:rPr b="0" lang="en-US" sz="2100" spc="-1" strike="noStrike">
                 <a:solidFill>
@@ -10907,120 +10338,33 @@
                 <a:latin typeface="Calibri Light"/>
                 <a:ea typeface="DejaVu Sans"/>
               </a:rPr>
-              <a:t>Hiera configuration of the Puppet environment</a:t>
+              <a:t>Inventories</a:t>
             </a:r>
             <a:endParaRPr b="0" lang="en-US" sz="2100" spc="-1" strike="noStrike">
               <a:latin typeface="Arial"/>
             </a:endParaRPr>
           </a:p>
           <a:p>
-            <a:pPr lvl="1" marL="432000" indent="-214920">
+            <a:pPr>
               <a:lnSpc>
                 <a:spcPct val="90000"/>
               </a:lnSpc>
               <a:spcBef>
                 <a:spcPts val="751"/>
               </a:spcBef>
-              <a:buClr>
-                <a:srgbClr val="000000"/>
-              </a:buClr>
-              <a:buSzPct val="45000"/>
-              <a:buFont typeface="Wingdings" charset="2"/>
-              <a:buChar char=""/>
-            </a:pPr>
-            <a:r>
-              <a:rPr b="0" lang="en-US" sz="2100" spc="-1" strike="noStrike">
-                <a:solidFill>
-                  <a:srgbClr val="004289"/>
-                </a:solidFill>
-                <a:latin typeface="Calibri Light"/>
-                <a:ea typeface="DejaVu Sans"/>
-              </a:rPr>
-              <a:t>Maintain common data in data/common.yaml</a:t>
-            </a:r>
+            </a:pPr>
             <a:endParaRPr b="0" lang="en-US" sz="2100" spc="-1" strike="noStrike">
               <a:latin typeface="Arial"/>
             </a:endParaRPr>
           </a:p>
           <a:p>
-            <a:pPr lvl="1" marL="432000" indent="-214920">
+            <a:pPr>
               <a:lnSpc>
                 <a:spcPct val="90000"/>
               </a:lnSpc>
               <a:spcBef>
                 <a:spcPts val="751"/>
               </a:spcBef>
-              <a:buClr>
-                <a:srgbClr val="000000"/>
-              </a:buClr>
-              <a:buSzPct val="45000"/>
-              <a:buFont typeface="Wingdings" charset="2"/>
-              <a:buChar char=""/>
-            </a:pPr>
-            <a:r>
-              <a:rPr b="0" lang="en-US" sz="2100" spc="-1" strike="noStrike">
-                <a:solidFill>
-                  <a:srgbClr val="004289"/>
-                </a:solidFill>
-                <a:latin typeface="Calibri Light"/>
-                <a:ea typeface="DejaVu Sans"/>
-              </a:rPr>
-              <a:t>Maintain node specific data in data/nodes/{node}.yaml</a:t>
-            </a:r>
-            <a:endParaRPr b="0" lang="en-US" sz="2100" spc="-1" strike="noStrike">
-              <a:latin typeface="Arial"/>
-            </a:endParaRPr>
-          </a:p>
-          <a:p>
-            <a:pPr lvl="1" marL="432000" indent="-214920">
-              <a:lnSpc>
-                <a:spcPct val="90000"/>
-              </a:lnSpc>
-              <a:spcBef>
-                <a:spcPts val="751"/>
-              </a:spcBef>
-              <a:buClr>
-                <a:srgbClr val="000000"/>
-              </a:buClr>
-              <a:buSzPct val="45000"/>
-              <a:buFont typeface="Wingdings" charset="2"/>
-              <a:buChar char=""/>
-            </a:pPr>
-            <a:r>
-              <a:rPr b="0" lang="en-US" sz="2100" spc="-1" strike="noStrike">
-                <a:solidFill>
-                  <a:srgbClr val="004289"/>
-                </a:solidFill>
-                <a:latin typeface="Calibri Light"/>
-                <a:ea typeface="DejaVu Sans"/>
-              </a:rPr>
-              <a:t>…</a:t>
-            </a:r>
-            <a:endParaRPr b="0" lang="en-US" sz="2100" spc="-1" strike="noStrike">
-              <a:latin typeface="Arial"/>
-            </a:endParaRPr>
-          </a:p>
-          <a:p>
-            <a:pPr>
-              <a:lnSpc>
-                <a:spcPct val="90000"/>
-              </a:lnSpc>
-              <a:spcBef>
-                <a:spcPts val="751"/>
-              </a:spcBef>
-            </a:pPr>
-            <a:endParaRPr b="0" lang="en-US" sz="2100" spc="-1" strike="noStrike">
-              <a:latin typeface="Arial"/>
-            </a:endParaRPr>
-          </a:p>
-          <a:p>
-            <a:pPr>
-              <a:lnSpc>
-                <a:spcPct val="90000"/>
-              </a:lnSpc>
-              <a:spcBef>
-                <a:spcPts val="751"/>
-              </a:spcBef>
             </a:pPr>
             <a:endParaRPr b="0" lang="en-US" sz="2100" spc="-1" strike="noStrike">
               <a:latin typeface="Arial"/>
@@ -11037,7 +10381,7 @@
         <p:spPr>
           <a:xfrm>
             <a:off x="6948360" y="182520"/>
-            <a:ext cx="2055600" cy="363240"/>
+            <a:ext cx="2054520" cy="362160"/>
           </a:xfrm>
           <a:prstGeom prst="rect">
             <a:avLst/>
@@ -11063,7 +10407,7 @@
                 <a:spcPct val="100000"/>
               </a:lnSpc>
             </a:pPr>
-            <a:fld id="{11C6466D-A04D-4C30-B683-5CD50D4F242D}" type="slidenum">
+            <a:fld id="{8890F45A-2641-4BAF-8974-5A663347BE1B}" type="slidenum">
               <a:rPr b="0" lang="en-US" sz="900" spc="-1" strike="noStrike">
                 <a:solidFill>
                   <a:srgbClr val="8b93b0"/>
@@ -11088,7 +10432,7 @@
         <p:spPr>
           <a:xfrm>
             <a:off x="628560" y="365040"/>
-            <a:ext cx="7885080" cy="685800"/>
+            <a:ext cx="7884000" cy="684720"/>
           </a:xfrm>
           <a:prstGeom prst="rect">
             <a:avLst/>
@@ -11122,7 +10466,7 @@
                 <a:latin typeface="Calibri Light"/>
                 <a:ea typeface="DejaVu Sans"/>
               </a:rPr>
-              <a:t>Managing data</a:t>
+              <a:t>Ansible</a:t>
             </a:r>
             <a:endParaRPr b="0" lang="en-US" sz="2800" spc="-1" strike="noStrike">
               <a:latin typeface="Arial"/>
@@ -11173,7 +10517,7 @@
         <p:spPr>
           <a:xfrm>
             <a:off x="548640" y="1097280"/>
-            <a:ext cx="7954200" cy="4160880"/>
+            <a:ext cx="7953120" cy="4159800"/>
           </a:xfrm>
           <a:prstGeom prst="rect">
             <a:avLst/>
@@ -11194,7 +10538,7 @@
             <a:noAutofit/>
           </a:bodyPr>
           <a:p>
-            <a:pPr marL="171360" indent="-169560">
+            <a:pPr marL="171360" indent="-168480">
               <a:lnSpc>
                 <a:spcPct val="90000"/>
               </a:lnSpc>
@@ -11215,72 +10559,27 @@
                 <a:latin typeface="Calibri Light"/>
                 <a:ea typeface="DejaVu Sans"/>
               </a:rPr>
-              <a:t>Check prerequisites</a:t>
+              <a:t>Beachte Best Practices für DevOps</a:t>
             </a:r>
             <a:endParaRPr b="0" lang="en-US" sz="2100" spc="-1" strike="noStrike">
               <a:latin typeface="Arial"/>
             </a:endParaRPr>
           </a:p>
           <a:p>
-            <a:pPr lvl="1" marL="432000" indent="-215280">
+            <a:pPr>
               <a:lnSpc>
                 <a:spcPct val="90000"/>
               </a:lnSpc>
               <a:spcBef>
                 <a:spcPts val="751"/>
               </a:spcBef>
-              <a:buClr>
-                <a:srgbClr val="000000"/>
-              </a:buClr>
-              <a:buSzPct val="45000"/>
-              <a:buFont typeface="Wingdings" charset="2"/>
-              <a:buChar char=""/>
-            </a:pPr>
-            <a:r>
-              <a:rPr b="0" lang="en-US" sz="2100" spc="-1" strike="noStrike">
-                <a:solidFill>
-                  <a:srgbClr val="004289"/>
-                </a:solidFill>
-                <a:latin typeface="Calibri Light"/>
-                <a:ea typeface="DejaVu Sans"/>
-              </a:rPr>
-              <a:t>Ensure target system requirements</a:t>
-            </a:r>
+            </a:pPr>
             <a:endParaRPr b="0" lang="en-US" sz="2100" spc="-1" strike="noStrike">
               <a:latin typeface="Arial"/>
             </a:endParaRPr>
           </a:p>
           <a:p>
-            <a:pPr lvl="1" marL="432000" indent="-215280">
-              <a:lnSpc>
-                <a:spcPct val="90000"/>
-              </a:lnSpc>
-              <a:spcBef>
-                <a:spcPts val="751"/>
-              </a:spcBef>
-              <a:buClr>
-                <a:srgbClr val="000000"/>
-              </a:buClr>
-              <a:buSzPct val="45000"/>
-              <a:buFont typeface="Wingdings" charset="2"/>
-              <a:buChar char=""/>
-            </a:pPr>
-            <a:r>
-              <a:rPr b="0" lang="en-US" sz="2100" spc="-1" strike="noStrike">
-                <a:solidFill>
-                  <a:srgbClr val="004289"/>
-                </a:solidFill>
-                <a:latin typeface="Calibri Light"/>
-                <a:ea typeface="DejaVu Sans"/>
-              </a:rPr>
-              <a:t>Provide licenses</a:t>
-            </a:r>
-            <a:endParaRPr b="0" lang="en-US" sz="2100" spc="-1" strike="noStrike">
-              <a:latin typeface="Arial"/>
-            </a:endParaRPr>
-          </a:p>
-          <a:p>
-            <a:pPr marL="171360" indent="-169560">
+            <a:pPr marL="171360" indent="-168480">
               <a:lnSpc>
                 <a:spcPct val="90000"/>
               </a:lnSpc>
@@ -11301,43 +10600,27 @@
                 <a:latin typeface="Calibri Light"/>
                 <a:ea typeface="DejaVu Sans"/>
               </a:rPr>
-              <a:t>Prepare a database (Oracle)</a:t>
+              <a:t>Verwende VCS für Konfigurationsdaten (Git)</a:t>
             </a:r>
             <a:endParaRPr b="0" lang="en-US" sz="2100" spc="-1" strike="noStrike">
               <a:latin typeface="Arial"/>
             </a:endParaRPr>
           </a:p>
           <a:p>
-            <a:pPr lvl="1" marL="432000" indent="-215280">
+            <a:pPr>
               <a:lnSpc>
                 <a:spcPct val="90000"/>
               </a:lnSpc>
               <a:spcBef>
                 <a:spcPts val="751"/>
               </a:spcBef>
-              <a:buClr>
-                <a:srgbClr val="000000"/>
-              </a:buClr>
-              <a:buSzPct val="45000"/>
-              <a:buFont typeface="Wingdings" charset="2"/>
-              <a:buChar char=""/>
-            </a:pPr>
-            <a:r>
-              <a:rPr b="0" lang="en-US" sz="2100" spc="-1" strike="noStrike">
-                <a:solidFill>
-                  <a:srgbClr val="004289"/>
-                </a:solidFill>
-                <a:latin typeface="Calibri Light"/>
-                <a:ea typeface="DejaVu Sans"/>
-              </a:rPr>
-              <a:t>Create tablespaces (tables, index, lob)</a:t>
-            </a:r>
+            </a:pPr>
             <a:endParaRPr b="0" lang="en-US" sz="2100" spc="-1" strike="noStrike">
               <a:latin typeface="Arial"/>
             </a:endParaRPr>
           </a:p>
           <a:p>
-            <a:pPr marL="171360" indent="-169560">
+            <a:pPr marL="171360" indent="-168480">
               <a:lnSpc>
                 <a:spcPct val="90000"/>
               </a:lnSpc>
@@ -11358,14 +10641,27 @@
                 <a:latin typeface="Calibri Light"/>
                 <a:ea typeface="DejaVu Sans"/>
               </a:rPr>
-              <a:t>Prepare deployment host (Linux recommended)</a:t>
+              <a:t>Pflege Zweig oder Repository pro Zielumgebung</a:t>
             </a:r>
             <a:endParaRPr b="0" lang="en-US" sz="2100" spc="-1" strike="noStrike">
               <a:latin typeface="Arial"/>
             </a:endParaRPr>
           </a:p>
           <a:p>
-            <a:pPr lvl="1" marL="432000" indent="-215280">
+            <a:pPr>
+              <a:lnSpc>
+                <a:spcPct val="90000"/>
+              </a:lnSpc>
+              <a:spcBef>
+                <a:spcPts val="751"/>
+              </a:spcBef>
+            </a:pPr>
+            <a:endParaRPr b="0" lang="en-US" sz="2100" spc="-1" strike="noStrike">
+              <a:latin typeface="Arial"/>
+            </a:endParaRPr>
+          </a:p>
+          <a:p>
+            <a:pPr marL="171360" indent="-168480">
               <a:lnSpc>
                 <a:spcPct val="90000"/>
               </a:lnSpc>
@@ -11373,11 +10669,10 @@
                 <a:spcPts val="751"/>
               </a:spcBef>
               <a:buClr>
-                <a:srgbClr val="000000"/>
+                <a:srgbClr val="004289"/>
               </a:buClr>
-              <a:buSzPct val="45000"/>
-              <a:buFont typeface="Wingdings" charset="2"/>
-              <a:buChar char=""/>
+              <a:buFont typeface="Arial"/>
+              <a:buChar char="•"/>
             </a:pPr>
             <a:r>
               <a:rPr b="0" lang="en-US" sz="2100" spc="-1" strike="noStrike">
@@ -11387,149 +10682,33 @@
                 <a:latin typeface="Calibri Light"/>
                 <a:ea typeface="DejaVu Sans"/>
               </a:rPr>
-              <a:t>Install DB migration tool packages</a:t>
+              <a:t>Nutze Tags</a:t>
             </a:r>
             <a:endParaRPr b="0" lang="en-US" sz="2100" spc="-1" strike="noStrike">
               <a:latin typeface="Arial"/>
             </a:endParaRPr>
           </a:p>
           <a:p>
-            <a:pPr lvl="1" marL="432000" indent="-215280">
+            <a:pPr>
               <a:lnSpc>
                 <a:spcPct val="90000"/>
               </a:lnSpc>
               <a:spcBef>
                 <a:spcPts val="751"/>
               </a:spcBef>
-              <a:buClr>
-                <a:srgbClr val="000000"/>
-              </a:buClr>
-              <a:buSzPct val="45000"/>
-              <a:buFont typeface="Wingdings" charset="2"/>
-              <a:buChar char=""/>
-            </a:pPr>
-            <a:r>
-              <a:rPr b="0" lang="en-US" sz="2100" spc="-1" strike="noStrike">
-                <a:solidFill>
-                  <a:srgbClr val="004289"/>
-                </a:solidFill>
-                <a:latin typeface="Calibri Light"/>
-                <a:ea typeface="DejaVu Sans"/>
-              </a:rPr>
-              <a:t>Ensure required tools are installed (Puppet Bolt, Git)</a:t>
-            </a:r>
+            </a:pPr>
             <a:endParaRPr b="0" lang="en-US" sz="2100" spc="-1" strike="noStrike">
               <a:latin typeface="Arial"/>
             </a:endParaRPr>
           </a:p>
           <a:p>
-            <a:pPr lvl="1" marL="432000" indent="-215280">
+            <a:pPr>
               <a:lnSpc>
                 <a:spcPct val="90000"/>
               </a:lnSpc>
               <a:spcBef>
                 <a:spcPts val="751"/>
               </a:spcBef>
-              <a:buClr>
-                <a:srgbClr val="000000"/>
-              </a:buClr>
-              <a:buSzPct val="45000"/>
-              <a:buFont typeface="Wingdings" charset="2"/>
-              <a:buChar char=""/>
-            </a:pPr>
-            <a:r>
-              <a:rPr b="0" lang="en-US" sz="2100" spc="-1" strike="noStrike">
-                <a:solidFill>
-                  <a:srgbClr val="004289"/>
-                </a:solidFill>
-                <a:latin typeface="Calibri Light"/>
-                <a:ea typeface="DejaVu Sans"/>
-              </a:rPr>
-              <a:t>Ensure ssh access to target node(s)</a:t>
-            </a:r>
-            <a:endParaRPr b="0" lang="en-US" sz="2100" spc="-1" strike="noStrike">
-              <a:latin typeface="Arial"/>
-            </a:endParaRPr>
-          </a:p>
-          <a:p>
-            <a:pPr lvl="1" marL="432000" indent="-215280">
-              <a:lnSpc>
-                <a:spcPct val="90000"/>
-              </a:lnSpc>
-              <a:spcBef>
-                <a:spcPts val="751"/>
-              </a:spcBef>
-              <a:buClr>
-                <a:srgbClr val="000000"/>
-              </a:buClr>
-              <a:buSzPct val="45000"/>
-              <a:buFont typeface="Wingdings" charset="2"/>
-              <a:buChar char=""/>
-            </a:pPr>
-            <a:r>
-              <a:rPr b="0" lang="en-US" sz="2100" spc="-1" strike="noStrike">
-                <a:solidFill>
-                  <a:srgbClr val="004289"/>
-                </a:solidFill>
-                <a:latin typeface="Calibri Light"/>
-                <a:ea typeface="DejaVu Sans"/>
-              </a:rPr>
-              <a:t>Configuration data of target environment</a:t>
-            </a:r>
-            <a:endParaRPr b="0" lang="en-US" sz="2100" spc="-1" strike="noStrike">
-              <a:latin typeface="Arial"/>
-            </a:endParaRPr>
-          </a:p>
-          <a:p>
-            <a:pPr lvl="1" marL="432000" indent="-215280">
-              <a:lnSpc>
-                <a:spcPct val="90000"/>
-              </a:lnSpc>
-              <a:spcBef>
-                <a:spcPts val="751"/>
-              </a:spcBef>
-              <a:buClr>
-                <a:srgbClr val="000000"/>
-              </a:buClr>
-              <a:buSzPct val="45000"/>
-              <a:buFont typeface="Wingdings" charset="2"/>
-              <a:buChar char=""/>
-            </a:pPr>
-            <a:r>
-              <a:rPr b="0" lang="en-US" sz="2100" spc="-1" strike="noStrike">
-                <a:solidFill>
-                  <a:srgbClr val="004289"/>
-                </a:solidFill>
-                <a:latin typeface="Calibri Light"/>
-                <a:ea typeface="DejaVu Sans"/>
-              </a:rPr>
-              <a:t>ABIS Backend release</a:t>
-            </a:r>
-            <a:endParaRPr b="0" lang="en-US" sz="2100" spc="-1" strike="noStrike">
-              <a:latin typeface="Arial"/>
-            </a:endParaRPr>
-          </a:p>
-          <a:p>
-            <a:pPr>
-              <a:lnSpc>
-                <a:spcPct val="90000"/>
-              </a:lnSpc>
-              <a:spcBef>
-                <a:spcPts val="751"/>
-              </a:spcBef>
-            </a:pPr>
-            <a:endParaRPr b="0" lang="en-US" sz="2100" spc="-1" strike="noStrike">
-              <a:latin typeface="Arial"/>
-            </a:endParaRPr>
-          </a:p>
-          <a:p>
-            <a:pPr>
-              <a:lnSpc>
-                <a:spcPct val="90000"/>
-              </a:lnSpc>
-              <a:spcBef>
-                <a:spcPts val="751"/>
-              </a:spcBef>
             </a:pPr>
             <a:endParaRPr b="0" lang="en-US" sz="2100" spc="-1" strike="noStrike">
               <a:latin typeface="Arial"/>
@@ -11546,7 +10725,7 @@
         <p:spPr>
           <a:xfrm>
             <a:off x="6948360" y="182520"/>
-            <a:ext cx="2055600" cy="363240"/>
+            <a:ext cx="2054520" cy="362160"/>
           </a:xfrm>
           <a:prstGeom prst="rect">
             <a:avLst/>
@@ -11572,7 +10751,7 @@
                 <a:spcPct val="100000"/>
               </a:lnSpc>
             </a:pPr>
-            <a:fld id="{B124C9FD-432C-4DF1-807F-C07BFE676C6C}" type="slidenum">
+            <a:fld id="{AFD5524E-4759-441E-87DD-BD86A7D34CC7}" type="slidenum">
               <a:rPr b="0" lang="en-US" sz="900" spc="-1" strike="noStrike">
                 <a:solidFill>
                   <a:srgbClr val="8b93b0"/>
@@ -11597,7 +10776,7 @@
         <p:spPr>
           <a:xfrm>
             <a:off x="628560" y="365040"/>
-            <a:ext cx="7885080" cy="685800"/>
+            <a:ext cx="7884000" cy="684720"/>
           </a:xfrm>
           <a:prstGeom prst="rect">
             <a:avLst/>
@@ -11631,7 +10810,7 @@
                 <a:latin typeface="Calibri Light"/>
                 <a:ea typeface="DejaVu Sans"/>
               </a:rPr>
-              <a:t>ABIS Backend installation</a:t>
+              <a:t>Verwaltung von Konfigurationsdaten</a:t>
             </a:r>
             <a:endParaRPr b="0" lang="en-US" sz="2800" spc="-1" strike="noStrike">
               <a:latin typeface="Arial"/>
@@ -11682,7 +10861,7 @@
         <p:spPr>
           <a:xfrm>
             <a:off x="548640" y="1097280"/>
-            <a:ext cx="7954200" cy="4160880"/>
+            <a:ext cx="7953120" cy="4159800"/>
           </a:xfrm>
           <a:prstGeom prst="rect">
             <a:avLst/>
@@ -11703,7 +10882,7 @@
             <a:noAutofit/>
           </a:bodyPr>
           <a:p>
-            <a:pPr marL="171360" indent="-169560">
+            <a:pPr marL="171360" indent="-168480">
               <a:lnSpc>
                 <a:spcPct val="90000"/>
               </a:lnSpc>
@@ -11724,14 +10903,14 @@
                 <a:latin typeface="Calibri Light"/>
                 <a:ea typeface="DejaVu Sans"/>
               </a:rPr>
-              <a:t>Install migration tool packages</a:t>
+              <a:t>Voraussetzungen erfüllt?</a:t>
             </a:r>
             <a:endParaRPr b="0" lang="en-US" sz="2100" spc="-1" strike="noStrike">
               <a:latin typeface="Arial"/>
             </a:endParaRPr>
           </a:p>
           <a:p>
-            <a:pPr lvl="1" marL="432000" indent="-216000">
+            <a:pPr lvl="1" marL="432000" indent="-214200">
               <a:lnSpc>
                 <a:spcPct val="90000"/>
               </a:lnSpc>
@@ -11753,14 +10932,14 @@
                 <a:latin typeface="Calibri Light"/>
                 <a:ea typeface="DejaVu Sans"/>
               </a:rPr>
-              <a:t>dermalog-biometric-store-migration-oracle</a:t>
+              <a:t>Zielsystem(e)?</a:t>
             </a:r>
             <a:endParaRPr b="0" lang="en-US" sz="2100" spc="-1" strike="noStrike">
               <a:latin typeface="Arial"/>
             </a:endParaRPr>
           </a:p>
           <a:p>
-            <a:pPr lvl="1" marL="432000" indent="-216000">
+            <a:pPr lvl="1" marL="432000" indent="-214200">
               <a:lnSpc>
                 <a:spcPct val="90000"/>
               </a:lnSpc>
@@ -11782,80 +10961,14 @@
                 <a:latin typeface="Calibri Light"/>
                 <a:ea typeface="DejaVu Sans"/>
               </a:rPr>
-              <a:t>dermalog-web-abis-migration-oracle</a:t>
-            </a:r>
-            <a:br/>
-            <a:r>
-              <a:rPr b="0" lang="en-US" sz="2100" spc="-1" strike="noStrike">
-                <a:solidFill>
-                  <a:srgbClr val="004289"/>
-                </a:solidFill>
-                <a:latin typeface="Calibri Light"/>
-              </a:rPr>
-              <a:t> </a:t>
+              <a:t>Paketrepositories?</a:t>
             </a:r>
             <a:endParaRPr b="0" lang="en-US" sz="2100" spc="-1" strike="noStrike">
               <a:latin typeface="Arial"/>
             </a:endParaRPr>
           </a:p>
           <a:p>
-            <a:pPr marL="171360" indent="-169560">
-              <a:lnSpc>
-                <a:spcPct val="90000"/>
-              </a:lnSpc>
-              <a:spcBef>
-                <a:spcPts val="751"/>
-              </a:spcBef>
-              <a:buClr>
-                <a:srgbClr val="004289"/>
-              </a:buClr>
-              <a:buFont typeface="Arial"/>
-              <a:buChar char="•"/>
-            </a:pPr>
-            <a:r>
-              <a:rPr b="0" lang="en-US" sz="2100" spc="-1" strike="noStrike">
-                <a:solidFill>
-                  <a:srgbClr val="004289"/>
-                </a:solidFill>
-                <a:latin typeface="Calibri Light"/>
-                <a:ea typeface="DejaVu Sans"/>
-              </a:rPr>
-              <a:t>cd /opt/dermalog/biometric-store-migration-oracle/</a:t>
-            </a:r>
-            <a:endParaRPr b="0" lang="en-US" sz="2100" spc="-1" strike="noStrike">
-              <a:latin typeface="Arial"/>
-            </a:endParaRPr>
-          </a:p>
-          <a:p>
-            <a:pPr marL="171360" indent="-169560">
-              <a:lnSpc>
-                <a:spcPct val="90000"/>
-              </a:lnSpc>
-              <a:spcBef>
-                <a:spcPts val="751"/>
-              </a:spcBef>
-              <a:buClr>
-                <a:srgbClr val="004289"/>
-              </a:buClr>
-              <a:buFont typeface="Arial"/>
-              <a:buChar char="•"/>
-            </a:pPr>
-            <a:r>
-              <a:rPr b="0" lang="en-US" sz="2100" spc="-1" strike="noStrike">
-                <a:solidFill>
-                  <a:srgbClr val="004289"/>
-                </a:solidFill>
-                <a:latin typeface="Calibri Light"/>
-                <a:ea typeface="DejaVu Sans"/>
-              </a:rPr>
-              <a:t>Run the migration tool</a:t>
-            </a:r>
-            <a:endParaRPr b="0" lang="en-US" sz="2100" spc="-1" strike="noStrike">
-              <a:latin typeface="Arial"/>
-            </a:endParaRPr>
-          </a:p>
-          <a:p>
-            <a:pPr lvl="1" marL="432000" indent="-216000">
+            <a:pPr lvl="1" marL="432000" indent="-214200">
               <a:lnSpc>
                 <a:spcPct val="90000"/>
               </a:lnSpc>
@@ -11877,14 +10990,14 @@
                 <a:latin typeface="Calibri Light"/>
                 <a:ea typeface="DejaVu Sans"/>
               </a:rPr>
-              <a:t>./migrate.sh</a:t>
+              <a:t>Lizenzen?</a:t>
             </a:r>
             <a:endParaRPr b="0" lang="en-US" sz="2100" spc="-1" strike="noStrike">
               <a:latin typeface="Arial"/>
             </a:endParaRPr>
           </a:p>
           <a:p>
-            <a:pPr lvl="1" marL="432000" indent="-216000">
+            <a:pPr lvl="1" marL="432000" indent="-214200">
               <a:lnSpc>
                 <a:spcPct val="90000"/>
               </a:lnSpc>
@@ -11906,52 +11019,14 @@
                 <a:latin typeface="Calibri Light"/>
                 <a:ea typeface="DejaVu Sans"/>
               </a:rPr>
-              <a:t>./validate</a:t>
-            </a:r>
-            <a:br/>
-            <a:r>
-              <a:rPr b="0" lang="en-US" sz="2100" spc="-1" strike="noStrike">
-                <a:solidFill>
-                  <a:srgbClr val="004289"/>
-                </a:solidFill>
-                <a:latin typeface="Calibri Light"/>
-              </a:rPr>
-              <a:t> </a:t>
+              <a:t>Datenbanksystem (z.B. Oracle)?</a:t>
             </a:r>
             <a:endParaRPr b="0" lang="en-US" sz="2100" spc="-1" strike="noStrike">
               <a:latin typeface="Arial"/>
             </a:endParaRPr>
           </a:p>
           <a:p>
-            <a:pPr marL="171360" indent="-169560">
-              <a:lnSpc>
-                <a:spcPct val="90000"/>
-              </a:lnSpc>
-              <a:spcBef>
-                <a:spcPts val="751"/>
-              </a:spcBef>
-              <a:buClr>
-                <a:srgbClr val="004289"/>
-              </a:buClr>
-              <a:buFont typeface="Arial"/>
-              <a:buChar char="•"/>
-            </a:pPr>
-            <a:r>
-              <a:rPr b="0" lang="en-US" sz="2100" spc="-1" strike="noStrike">
-                <a:solidFill>
-                  <a:srgbClr val="004289"/>
-                </a:solidFill>
-                <a:latin typeface="Calibri Light"/>
-                <a:ea typeface="DejaVu Sans"/>
-              </a:rPr>
-              <a:t>cd /opt/dermalog/web-abis-migration-oracle/</a:t>
-            </a:r>
-            <a:endParaRPr b="0" lang="en-US" sz="2100" spc="-1" strike="noStrike">
-              <a:latin typeface="Arial"/>
-            </a:endParaRPr>
-          </a:p>
-          <a:p>
-            <a:pPr lvl="1" marL="432000" indent="-216000">
+            <a:pPr lvl="2" marL="648000" indent="-215280">
               <a:lnSpc>
                 <a:spcPct val="90000"/>
               </a:lnSpc>
@@ -11973,14 +11048,55 @@
                 <a:latin typeface="Calibri Light"/>
                 <a:ea typeface="DejaVu Sans"/>
               </a:rPr>
-              <a:t>Run the migration tool</a:t>
+              <a:t>Tablespaces (tables, index, lob)</a:t>
             </a:r>
             <a:endParaRPr b="0" lang="en-US" sz="2100" spc="-1" strike="noStrike">
               <a:latin typeface="Arial"/>
             </a:endParaRPr>
           </a:p>
           <a:p>
-            <a:pPr lvl="1" marL="432000" indent="-216000">
+            <a:pPr>
+              <a:lnSpc>
+                <a:spcPct val="90000"/>
+              </a:lnSpc>
+              <a:spcBef>
+                <a:spcPts val="751"/>
+              </a:spcBef>
+            </a:pPr>
+            <a:endParaRPr b="0" lang="en-US" sz="2100" spc="-1" strike="noStrike">
+              <a:latin typeface="Arial"/>
+            </a:endParaRPr>
+          </a:p>
+          <a:p>
+            <a:pPr marL="171360" indent="-168480">
+              <a:lnSpc>
+                <a:spcPct val="90000"/>
+              </a:lnSpc>
+              <a:spcBef>
+                <a:spcPts val="751"/>
+              </a:spcBef>
+              <a:buClr>
+                <a:srgbClr val="004289"/>
+              </a:buClr>
+              <a:buFont typeface="Arial"/>
+              <a:buChar char="•"/>
+            </a:pPr>
+            <a:r>
+              <a:rPr b="0" lang="en-US" sz="2100" spc="-1" strike="noStrike">
+                <a:solidFill>
+                  <a:srgbClr val="004289"/>
+                </a:solidFill>
+                <a:latin typeface="Calibri Light"/>
+                <a:ea typeface="DejaVu Sans"/>
+              </a:rPr>
+              <a:t>Verwaltungsknoten (Linux)?</a:t>
+            </a:r>
+            <a:endParaRPr b="0" lang="en-US" sz="2100" spc="-1" strike="noStrike">
+              <a:latin typeface="Arial"/>
+            </a:endParaRPr>
+          </a:p>
+          <a:p>
+            <a:pPr lvl="1" marL="432000" indent="-214200">
               <a:lnSpc>
                 <a:spcPct val="90000"/>
               </a:lnSpc>
@@ -12002,14 +11118,14 @@
                 <a:latin typeface="Calibri Light"/>
                 <a:ea typeface="DejaVu Sans"/>
               </a:rPr>
-              <a:t>./migrate.sh</a:t>
+              <a:t>Werkzeuge installiert (Ansible, Git)</a:t>
             </a:r>
             <a:endParaRPr b="0" lang="en-US" sz="2100" spc="-1" strike="noStrike">
               <a:latin typeface="Arial"/>
             </a:endParaRPr>
           </a:p>
           <a:p>
-            <a:pPr lvl="1" marL="432000" indent="-216000">
+            <a:pPr lvl="1" marL="432000" indent="-214200">
               <a:lnSpc>
                 <a:spcPct val="90000"/>
               </a:lnSpc>
@@ -12031,21 +11147,37 @@
                 <a:latin typeface="Calibri Light"/>
                 <a:ea typeface="DejaVu Sans"/>
               </a:rPr>
-              <a:t>./validate</a:t>
+              <a:t>Ssh Verbindung zu Zielknoten</a:t>
             </a:r>
             <a:endParaRPr b="0" lang="en-US" sz="2100" spc="-1" strike="noStrike">
               <a:latin typeface="Arial"/>
             </a:endParaRPr>
           </a:p>
           <a:p>
-            <a:pPr>
+            <a:pPr lvl="1" marL="432000" indent="-214200">
               <a:lnSpc>
                 <a:spcPct val="90000"/>
               </a:lnSpc>
               <a:spcBef>
                 <a:spcPts val="751"/>
               </a:spcBef>
-            </a:pPr>
+              <a:buClr>
+                <a:srgbClr val="000000"/>
+              </a:buClr>
+              <a:buSzPct val="45000"/>
+              <a:buFont typeface="Wingdings" charset="2"/>
+              <a:buChar char=""/>
+            </a:pPr>
+            <a:r>
+              <a:rPr b="0" lang="en-US" sz="2100" spc="-1" strike="noStrike">
+                <a:solidFill>
+                  <a:srgbClr val="004289"/>
+                </a:solidFill>
+                <a:latin typeface="Calibri Light"/>
+                <a:ea typeface="DejaVu Sans"/>
+              </a:rPr>
+              <a:t>Konfigurationsdaten der Zielumgebung</a:t>
+            </a:r>
             <a:endParaRPr b="0" lang="en-US" sz="2100" spc="-1" strike="noStrike">
               <a:latin typeface="Arial"/>
             </a:endParaRPr>
@@ -12063,6 +11195,19 @@
               <a:latin typeface="Arial"/>
             </a:endParaRPr>
           </a:p>
+          <a:p>
+            <a:pPr>
+              <a:lnSpc>
+                <a:spcPct val="90000"/>
+              </a:lnSpc>
+              <a:spcBef>
+                <a:spcPts val="751"/>
+              </a:spcBef>
+            </a:pPr>
+            <a:endParaRPr b="0" lang="en-US" sz="2100" spc="-1" strike="noStrike">
+              <a:latin typeface="Arial"/>
+            </a:endParaRPr>
+          </a:p>
         </p:txBody>
       </p:sp>
       <p:sp>
@@ -12074,7 +11219,7 @@
         <p:spPr>
           <a:xfrm>
             <a:off x="6948360" y="182520"/>
-            <a:ext cx="2055600" cy="363240"/>
+            <a:ext cx="2054520" cy="362160"/>
           </a:xfrm>
           <a:prstGeom prst="rect">
             <a:avLst/>
@@ -12100,7 +11245,7 @@
                 <a:spcPct val="100000"/>
               </a:lnSpc>
             </a:pPr>
-            <a:fld id="{7CE0A506-2143-408C-8B02-29EF48DF4D3B}" type="slidenum">
+            <a:fld id="{869F4106-0FE3-4EA4-8089-9560E09AC010}" type="slidenum">
               <a:rPr b="0" lang="en-US" sz="900" spc="-1" strike="noStrike">
                 <a:solidFill>
                   <a:srgbClr val="8b93b0"/>
@@ -12125,7 +11270,7 @@
         <p:spPr>
           <a:xfrm>
             <a:off x="628560" y="365040"/>
-            <a:ext cx="7885080" cy="685800"/>
+            <a:ext cx="7884000" cy="684720"/>
           </a:xfrm>
           <a:prstGeom prst="rect">
             <a:avLst/>
@@ -12159,7 +11304,7 @@
                 <a:latin typeface="Calibri Light"/>
                 <a:ea typeface="DejaVu Sans"/>
               </a:rPr>
-              <a:t>ABIS Backend preparing the database</a:t>
+              <a:t>ABIS Backend Installation</a:t>
             </a:r>
             <a:endParaRPr b="0" lang="en-US" sz="2800" spc="-1" strike="noStrike">
               <a:latin typeface="Arial"/>
@@ -12210,7 +11355,7 @@
         <p:spPr>
           <a:xfrm>
             <a:off x="548640" y="1097280"/>
-            <a:ext cx="7954200" cy="4160880"/>
+            <a:ext cx="7953120" cy="4159800"/>
           </a:xfrm>
           <a:prstGeom prst="rect">
             <a:avLst/>
@@ -12231,7 +11376,7 @@
             <a:noAutofit/>
           </a:bodyPr>
           <a:p>
-            <a:pPr marL="171360" indent="-169560">
+            <a:pPr marL="171360" indent="-168480">
               <a:lnSpc>
                 <a:spcPct val="90000"/>
               </a:lnSpc>
@@ -12252,14 +11397,14 @@
                 <a:latin typeface="Calibri Light"/>
                 <a:ea typeface="DejaVu Sans"/>
               </a:rPr>
-              <a:t>Open console (terminal, Powershell on Windows)</a:t>
+              <a:t>Ausführung der Deploymentskripte in der Konsole</a:t>
             </a:r>
             <a:endParaRPr b="0" lang="en-US" sz="2100" spc="-1" strike="noStrike">
               <a:latin typeface="Arial"/>
             </a:endParaRPr>
           </a:p>
           <a:p>
-            <a:pPr marL="171360" indent="-169560">
+            <a:pPr lvl="1" marL="432000" indent="-215280">
               <a:lnSpc>
                 <a:spcPct val="90000"/>
               </a:lnSpc>
@@ -12267,10 +11412,11 @@
                 <a:spcPts val="751"/>
               </a:spcBef>
               <a:buClr>
-                <a:srgbClr val="004289"/>
+                <a:srgbClr val="000000"/>
               </a:buClr>
-              <a:buFont typeface="Arial"/>
-              <a:buChar char="•"/>
+              <a:buSzPct val="45000"/>
+              <a:buFont typeface="Wingdings" charset="2"/>
+              <a:buChar char=""/>
             </a:pPr>
             <a:r>
               <a:rPr b="0" lang="en-US" sz="2100" spc="-1" strike="noStrike">
@@ -12280,14 +11426,14 @@
                 <a:latin typeface="Calibri Light"/>
                 <a:ea typeface="DejaVu Sans"/>
               </a:rPr>
-              <a:t>cd into installer directory of ABIS Backend release</a:t>
+              <a:t>Ansible Playbook</a:t>
             </a:r>
             <a:endParaRPr b="0" lang="en-US" sz="2100" spc="-1" strike="noStrike">
               <a:latin typeface="Arial"/>
             </a:endParaRPr>
           </a:p>
           <a:p>
-            <a:pPr marL="171360" indent="-169560">
+            <a:pPr lvl="1" marL="432000" indent="-215280">
               <a:lnSpc>
                 <a:spcPct val="90000"/>
               </a:lnSpc>
@@ -12295,10 +11441,11 @@
                 <a:spcPts val="751"/>
               </a:spcBef>
               <a:buClr>
-                <a:srgbClr val="004289"/>
+                <a:srgbClr val="000000"/>
               </a:buClr>
-              <a:buFont typeface="Arial"/>
-              <a:buChar char="•"/>
+              <a:buSzPct val="45000"/>
+              <a:buFont typeface="Wingdings" charset="2"/>
+              <a:buChar char=""/>
             </a:pPr>
             <a:r>
               <a:rPr b="0" lang="en-US" sz="2100" spc="-1" strike="noStrike">
@@ -12308,38 +11455,14 @@
                 <a:latin typeface="Calibri Light"/>
                 <a:ea typeface="DejaVu Sans"/>
               </a:rPr>
-              <a:t>Run installer</a:t>
-            </a:r>
-            <a:br/>
-            <a:r>
-              <a:rPr b="0" lang="en-US" sz="1800" spc="-1" strike="noStrike">
-                <a:solidFill>
-                  <a:srgbClr val="004289"/>
-                </a:solidFill>
-                <a:latin typeface="DejaVu Sans Mono"/>
-                <a:ea typeface="DejaVu Sans"/>
-              </a:rPr>
-              <a:t>bolt plan run abis_install::standalone role=webabis_nist -t &lt;target host&gt; -u root ...</a:t>
-            </a:r>
-            <a:endParaRPr b="0" lang="en-US" sz="1800" spc="-1" strike="noStrike">
-              <a:latin typeface="Arial"/>
-            </a:endParaRPr>
-          </a:p>
-          <a:p>
-            <a:pPr>
-              <a:lnSpc>
-                <a:spcPct val="90000"/>
-              </a:lnSpc>
-              <a:spcBef>
-                <a:spcPts val="751"/>
-              </a:spcBef>
-            </a:pPr>
-            <a:endParaRPr b="0" lang="en-US" sz="1800" spc="-1" strike="noStrike">
-              <a:latin typeface="Arial"/>
-            </a:endParaRPr>
-          </a:p>
-          <a:p>
-            <a:pPr marL="171360" indent="-169560">
+              <a:t>(Puppet Bolt Plan)</a:t>
+            </a:r>
+            <a:endParaRPr b="0" lang="en-US" sz="2100" spc="-1" strike="noStrike">
+              <a:latin typeface="Arial"/>
+            </a:endParaRPr>
+          </a:p>
+          <a:p>
+            <a:pPr lvl="1" marL="432000" indent="-215280">
               <a:lnSpc>
                 <a:spcPct val="90000"/>
               </a:lnSpc>
@@ -12347,10 +11470,11 @@
                 <a:spcPts val="751"/>
               </a:spcBef>
               <a:buClr>
-                <a:srgbClr val="004289"/>
+                <a:srgbClr val="000000"/>
               </a:buClr>
-              <a:buFont typeface="Arial"/>
-              <a:buChar char="•"/>
+              <a:buSzPct val="45000"/>
+              <a:buFont typeface="Wingdings" charset="2"/>
+              <a:buChar char=""/>
             </a:pPr>
             <a:r>
               <a:rPr b="0" lang="en-US" sz="2100" spc="-1" strike="noStrike">
@@ -12360,20 +11484,9 @@
                 <a:latin typeface="Calibri Light"/>
                 <a:ea typeface="DejaVu Sans"/>
               </a:rPr>
-              <a:t>Check target system state</a:t>
-            </a:r>
-            <a:br/>
-            <a:r>
-              <a:rPr b="0" lang="en-US" sz="1800" spc="-1" strike="noStrike">
-                <a:solidFill>
-                  <a:srgbClr val="004289"/>
-                </a:solidFill>
-                <a:latin typeface="DejaVu Sans Mono"/>
-                <a:ea typeface="DejaVu Sans"/>
-              </a:rPr>
-              <a:t>bolt command run ‘abis_systemcheck.sh’ -t &lt;target host&gt; -u root ...</a:t>
-            </a:r>
-            <a:endParaRPr b="0" lang="en-US" sz="1800" spc="-1" strike="noStrike">
+              <a:t>(Puppet Agent)</a:t>
+            </a:r>
+            <a:endParaRPr b="0" lang="en-US" sz="2100" spc="-1" strike="noStrike">
               <a:latin typeface="Arial"/>
             </a:endParaRPr>
           </a:p>
@@ -12386,7 +11499,7 @@
                 <a:spcPts val="751"/>
               </a:spcBef>
             </a:pPr>
-            <a:endParaRPr b="0" lang="en-US" sz="1800" spc="-1" strike="noStrike">
+            <a:endParaRPr b="0" lang="en-US" sz="2100" spc="-1" strike="noStrike">
               <a:latin typeface="Arial"/>
             </a:endParaRPr>
           </a:p>
@@ -12399,7 +11512,7 @@
                 <a:spcPts val="751"/>
               </a:spcBef>
             </a:pPr>
-            <a:endParaRPr b="0" lang="en-US" sz="1800" spc="-1" strike="noStrike">
+            <a:endParaRPr b="0" lang="en-US" sz="2100" spc="-1" strike="noStrike">
               <a:latin typeface="Arial"/>
             </a:endParaRPr>
           </a:p>
@@ -12414,7 +11527,7 @@
         <p:spPr>
           <a:xfrm>
             <a:off x="6948360" y="182520"/>
-            <a:ext cx="2055600" cy="363240"/>
+            <a:ext cx="2054520" cy="362160"/>
           </a:xfrm>
           <a:prstGeom prst="rect">
             <a:avLst/>
@@ -12440,7 +11553,7 @@
                 <a:spcPct val="100000"/>
               </a:lnSpc>
             </a:pPr>
-            <a:fld id="{75358948-BA13-46A8-87BF-9BCA45F0EEA4}" type="slidenum">
+            <a:fld id="{D968F96D-6E7B-471D-8048-85964AF9625F}" type="slidenum">
               <a:rPr b="0" lang="en-US" sz="900" spc="-1" strike="noStrike">
                 <a:solidFill>
                   <a:srgbClr val="8b93b0"/>
@@ -12465,7 +11578,7 @@
         <p:spPr>
           <a:xfrm>
             <a:off x="628560" y="365040"/>
-            <a:ext cx="7885080" cy="685800"/>
+            <a:ext cx="7884000" cy="684720"/>
           </a:xfrm>
           <a:prstGeom prst="rect">
             <a:avLst/>
@@ -12499,7 +11612,7 @@
                 <a:latin typeface="Calibri Light"/>
                 <a:ea typeface="DejaVu Sans"/>
               </a:rPr>
-              <a:t>ABIS Backend installation steps</a:t>
+              <a:t>ABIS Backend Installation</a:t>
             </a:r>
             <a:endParaRPr b="0" lang="en-US" sz="2800" spc="-1" strike="noStrike">
               <a:latin typeface="Arial"/>

</xml_diff>